<commit_message>
Addded details about pagedown
</commit_message>
<xml_diff>
--- a/src/posters.pptx
+++ b/src/posters.pptx
@@ -13,6 +13,12 @@
     <p:sldId id="261" r:id="rId7"/>
     <p:sldId id="262" r:id="rId8"/>
     <p:sldId id="263" r:id="rId9"/>
+    <p:sldId id="264" r:id="rId10"/>
+    <p:sldId id="265" r:id="rId11"/>
+    <p:sldId id="266" r:id="rId12"/>
+    <p:sldId id="267" r:id="rId13"/>
+    <p:sldId id="268" r:id="rId14"/>
+    <p:sldId id="269" r:id="rId15"/>
   </p:sldIdLst>
   <p:sldSz cx="9144000" cy="6858000" type="screen4x3"/>
   <p:notesSz cx="6858000" cy="9144000"/>
@@ -3234,6 +3240,594 @@
 </p:sld>
 </file>
 
+<file path=ppt/slides/slide10.xml><?xml version="1.0" encoding="utf-8"?>
+<p:sld xmlns:a="http://schemas.openxmlformats.org/drawingml/2006/main" xmlns:r="http://schemas.openxmlformats.org/officeDocument/2006/relationships" xmlns:p="http://schemas.openxmlformats.org/presentationml/2006/main">
+  <p:cSld>
+    <p:spTree>
+      <p:nvGrpSpPr>
+        <p:cNvPr id="1" name=""/>
+        <p:cNvGrpSpPr/>
+        <p:nvPr/>
+      </p:nvGrpSpPr>
+      <p:grpSpPr>
+        <a:xfrm>
+          <a:off x="0" y="0"/>
+          <a:ext cx="0" cy="0"/>
+          <a:chOff x="0" y="0"/>
+          <a:chExt cx="0" cy="0"/>
+        </a:xfrm>
+      </p:grpSpPr>
+      <p:sp>
+        <p:nvSpPr>
+          <p:cNvPr id="2" name="Title 1"/>
+          <p:cNvSpPr>
+            <a:spLocks noGrp="1"/>
+          </p:cNvSpPr>
+          <p:nvPr>
+            <p:ph type="title"/>
+          </p:nvPr>
+        </p:nvSpPr>
+        <p:spPr/>
+        <p:txBody>
+          <a:bodyPr/>
+          <a:lstStyle/>
+          <a:p>
+            <a:pPr lvl="0" marL="0" indent="0">
+              <a:buNone/>
+            </a:pPr>
+            <a:r>
+              <a:rPr/>
+              <a:t>Pandoc</a:t>
+            </a:r>
+            <a:r>
+              <a:rPr/>
+              <a:t> </a:t>
+            </a:r>
+            <a:r>
+              <a:rPr/>
+              <a:t>is</a:t>
+            </a:r>
+            <a:r>
+              <a:rPr/>
+              <a:t> </a:t>
+            </a:r>
+            <a:r>
+              <a:rPr/>
+              <a:t>the</a:t>
+            </a:r>
+            <a:r>
+              <a:rPr/>
+              <a:t> </a:t>
+            </a:r>
+            <a:r>
+              <a:rPr/>
+              <a:t>foundation</a:t>
+            </a:r>
+          </a:p>
+        </p:txBody>
+      </p:sp>
+      <p:pic>
+        <p:nvPicPr>
+          <p:cNvPr descr="../images/pandoc.png" id="0" name="Picture 1"/>
+          <p:cNvPicPr>
+            <a:picLocks noGrp="1" noChangeAspect="1"/>
+          </p:cNvPicPr>
+          <p:nvPr/>
+        </p:nvPicPr>
+        <p:blipFill>
+          <a:blip r:embed="rId2"/>
+          <a:stretch>
+            <a:fillRect/>
+          </a:stretch>
+        </p:blipFill>
+        <p:spPr bwMode="auto">
+          <a:xfrm>
+            <a:off x="2463800" y="1600200"/>
+            <a:ext cx="4229100" cy="4013200"/>
+          </a:xfrm>
+          <a:prstGeom prst="rect">
+            <a:avLst/>
+          </a:prstGeom>
+          <a:noFill/>
+          <a:ln w="9525">
+            <a:noFill/>
+            <a:headEnd/>
+            <a:tailEnd/>
+          </a:ln>
+        </p:spPr>
+      </p:pic>
+      <p:sp>
+        <p:nvSpPr>
+          <p:cNvPr id="1" name="TextBox 3"/>
+          <p:cNvSpPr txBox="1"/>
+          <p:nvPr/>
+        </p:nvSpPr>
+        <p:spPr>
+          <a:xfrm>
+            <a:off x="457200" y="5613400"/>
+            <a:ext cx="8229600" cy="508000"/>
+          </a:xfrm>
+          <a:prstGeom prst="rect">
+            <a:avLst/>
+          </a:prstGeom>
+          <a:noFill/>
+        </p:spPr>
+        <p:txBody>
+          <a:bodyPr/>
+          <a:lstStyle/>
+          <a:p>
+            <a:pPr lvl="0" marL="0" indent="0" algn="ctr">
+              <a:buNone/>
+            </a:pPr>
+            <a:r>
+              <a:rPr/>
+              <a:t>Pandoc</a:t>
+            </a:r>
+            <a:r>
+              <a:rPr/>
+              <a:t> </a:t>
+            </a:r>
+            <a:r>
+              <a:rPr/>
+              <a:t>website</a:t>
+            </a:r>
+          </a:p>
+        </p:txBody>
+      </p:sp>
+    </p:spTree>
+  </p:cSld>
+</p:sld>
+</file>
+
+<file path=ppt/slides/slide11.xml><?xml version="1.0" encoding="utf-8"?>
+<p:sld xmlns:a="http://schemas.openxmlformats.org/drawingml/2006/main" xmlns:r="http://schemas.openxmlformats.org/officeDocument/2006/relationships" xmlns:p="http://schemas.openxmlformats.org/presentationml/2006/main">
+  <p:cSld>
+    <p:spTree>
+      <p:nvGrpSpPr>
+        <p:cNvPr id="1" name=""/>
+        <p:cNvGrpSpPr/>
+        <p:nvPr/>
+      </p:nvGrpSpPr>
+      <p:grpSpPr>
+        <a:xfrm>
+          <a:off x="0" y="0"/>
+          <a:ext cx="0" cy="0"/>
+          <a:chOff x="0" y="0"/>
+          <a:chExt cx="0" cy="0"/>
+        </a:xfrm>
+      </p:grpSpPr>
+      <p:sp>
+        <p:nvSpPr>
+          <p:cNvPr id="2" name="Title 1"/>
+          <p:cNvSpPr>
+            <a:spLocks noGrp="1"/>
+          </p:cNvSpPr>
+          <p:nvPr>
+            <p:ph type="title"/>
+          </p:nvPr>
+        </p:nvSpPr>
+        <p:spPr/>
+        <p:txBody>
+          <a:bodyPr/>
+          <a:lstStyle/>
+          <a:p>
+            <a:pPr lvl="0" marL="0" indent="0">
+              <a:buNone/>
+            </a:pPr>
+            <a:r>
+              <a:rPr/>
+              <a:t>Markdown</a:t>
+            </a:r>
+          </a:p>
+        </p:txBody>
+      </p:sp>
+      <p:sp>
+        <p:nvSpPr>
+          <p:cNvPr id="3" name="Content Placeholder 2"/>
+          <p:cNvSpPr>
+            <a:spLocks noGrp="1"/>
+          </p:cNvSpPr>
+          <p:nvPr>
+            <p:ph idx="1"/>
+          </p:nvPr>
+        </p:nvSpPr>
+        <p:spPr/>
+        <p:txBody>
+          <a:bodyPr/>
+          <a:lstStyle/>
+          <a:p>
+            <a:pPr lvl="1"/>
+            <a:r>
+              <a:rPr/>
+              <a:t>Simplified version of markup (html, LaTeX)</a:t>
+            </a:r>
+          </a:p>
+          <a:p>
+            <a:pPr lvl="2"/>
+            <a:r>
+              <a:rPr/>
+              <a:t>Smaller feature set</a:t>
+            </a:r>
+          </a:p>
+          <a:p>
+            <a:pPr lvl="2"/>
+            <a:r>
+              <a:rPr/>
+              <a:t>Readable input</a:t>
+            </a:r>
+          </a:p>
+          <a:p>
+            <a:pPr lvl="2"/>
+            <a:r>
+              <a:rPr/>
+              <a:t>Easy to learn</a:t>
+            </a:r>
+          </a:p>
+          <a:p>
+            <a:pPr lvl="1"/>
+            <a:r>
+              <a:rPr/>
+              <a:t>Similar in spirit to yaml</a:t>
+            </a:r>
+          </a:p>
+        </p:txBody>
+      </p:sp>
+    </p:spTree>
+  </p:cSld>
+</p:sld>
+</file>
+
+<file path=ppt/slides/slide12.xml><?xml version="1.0" encoding="utf-8"?>
+<p:sld xmlns:a="http://schemas.openxmlformats.org/drawingml/2006/main" xmlns:r="http://schemas.openxmlformats.org/officeDocument/2006/relationships" xmlns:p="http://schemas.openxmlformats.org/presentationml/2006/main">
+  <p:cSld>
+    <p:spTree>
+      <p:nvGrpSpPr>
+        <p:cNvPr id="1" name=""/>
+        <p:cNvGrpSpPr/>
+        <p:nvPr/>
+      </p:nvGrpSpPr>
+      <p:grpSpPr>
+        <a:xfrm>
+          <a:off x="0" y="0"/>
+          <a:ext cx="0" cy="0"/>
+          <a:chOff x="0" y="0"/>
+          <a:chExt cx="0" cy="0"/>
+        </a:xfrm>
+      </p:grpSpPr>
+      <p:sp>
+        <p:nvSpPr>
+          <p:cNvPr id="2" name="Title 1"/>
+          <p:cNvSpPr>
+            <a:spLocks noGrp="1"/>
+          </p:cNvSpPr>
+          <p:nvPr>
+            <p:ph type="title"/>
+          </p:nvPr>
+        </p:nvSpPr>
+        <p:spPr/>
+        <p:txBody>
+          <a:bodyPr/>
+          <a:lstStyle/>
+          <a:p>
+            <a:pPr lvl="0" marL="0" indent="0">
+              <a:buNone/>
+            </a:pPr>
+            <a:r>
+              <a:rPr/>
+              <a:t>What</a:t>
+            </a:r>
+            <a:r>
+              <a:rPr/>
+              <a:t> </a:t>
+            </a:r>
+            <a:r>
+              <a:rPr/>
+              <a:t>can</a:t>
+            </a:r>
+            <a:r>
+              <a:rPr/>
+              <a:t> </a:t>
+            </a:r>
+            <a:r>
+              <a:rPr/>
+              <a:t>you</a:t>
+            </a:r>
+            <a:r>
+              <a:rPr/>
+              <a:t> </a:t>
+            </a:r>
+            <a:r>
+              <a:rPr/>
+              <a:t>create?</a:t>
+            </a:r>
+          </a:p>
+        </p:txBody>
+      </p:sp>
+      <p:sp>
+        <p:nvSpPr>
+          <p:cNvPr id="3" name="Content Placeholder 2"/>
+          <p:cNvSpPr>
+            <a:spLocks noGrp="1"/>
+          </p:cNvSpPr>
+          <p:nvPr>
+            <p:ph idx="1"/>
+          </p:nvPr>
+        </p:nvSpPr>
+        <p:spPr/>
+        <p:txBody>
+          <a:bodyPr/>
+          <a:lstStyle/>
+          <a:p>
+            <a:pPr lvl="1"/>
+            <a:r>
+              <a:rPr/>
+              <a:t>Web pages</a:t>
+            </a:r>
+          </a:p>
+          <a:p>
+            <a:pPr lvl="2"/>
+            <a:r>
+              <a:rPr/>
+              <a:t>Blog site</a:t>
+            </a:r>
+          </a:p>
+          <a:p>
+            <a:pPr lvl="2"/>
+            <a:r>
+              <a:rPr/>
+              <a:t>Books</a:t>
+            </a:r>
+          </a:p>
+          <a:p>
+            <a:pPr lvl="1"/>
+            <a:r>
+              <a:rPr/>
+              <a:t>PDF documents</a:t>
+            </a:r>
+          </a:p>
+          <a:p>
+            <a:pPr lvl="1"/>
+            <a:r>
+              <a:rPr/>
+              <a:t>Presentations</a:t>
+            </a:r>
+          </a:p>
+          <a:p>
+            <a:pPr lvl="2"/>
+            <a:r>
+              <a:rPr/>
+              <a:t>Powerpoint</a:t>
+            </a:r>
+          </a:p>
+          <a:p>
+            <a:pPr lvl="2"/>
+            <a:r>
+              <a:rPr/>
+              <a:t>html presentations (ioslides, slidy)</a:t>
+            </a:r>
+          </a:p>
+          <a:p>
+            <a:pPr lvl="2"/>
+            <a:r>
+              <a:rPr/>
+              <a:t>PDF presentations (Beamer)</a:t>
+            </a:r>
+          </a:p>
+        </p:txBody>
+      </p:sp>
+    </p:spTree>
+  </p:cSld>
+</p:sld>
+</file>
+
+<file path=ppt/slides/slide13.xml><?xml version="1.0" encoding="utf-8"?>
+<p:sld xmlns:a="http://schemas.openxmlformats.org/drawingml/2006/main" xmlns:r="http://schemas.openxmlformats.org/officeDocument/2006/relationships" xmlns:p="http://schemas.openxmlformats.org/presentationml/2006/main">
+  <p:cSld>
+    <p:spTree>
+      <p:nvGrpSpPr>
+        <p:cNvPr id="1" name=""/>
+        <p:cNvGrpSpPr/>
+        <p:nvPr/>
+      </p:nvGrpSpPr>
+      <p:grpSpPr>
+        <a:xfrm>
+          <a:off x="0" y="0"/>
+          <a:ext cx="0" cy="0"/>
+          <a:chOff x="0" y="0"/>
+          <a:chExt cx="0" cy="0"/>
+        </a:xfrm>
+      </p:grpSpPr>
+      <p:sp>
+        <p:nvSpPr>
+          <p:cNvPr id="2" name="Title 1"/>
+          <p:cNvSpPr>
+            <a:spLocks noGrp="1"/>
+          </p:cNvSpPr>
+          <p:nvPr>
+            <p:ph type="title"/>
+          </p:nvPr>
+        </p:nvSpPr>
+        <p:spPr/>
+        <p:txBody>
+          <a:bodyPr/>
+          <a:lstStyle/>
+          <a:p>
+            <a:pPr lvl="0" marL="0" indent="0">
+              <a:buNone/>
+            </a:pPr>
+            <a:r>
+              <a:rPr/>
+              <a:t>Pagedown</a:t>
+            </a:r>
+          </a:p>
+        </p:txBody>
+      </p:sp>
+      <p:pic>
+        <p:nvPicPr>
+          <p:cNvPr descr="../images/pagedown.png" id="0" name="Picture 1"/>
+          <p:cNvPicPr>
+            <a:picLocks noGrp="1" noChangeAspect="1"/>
+          </p:cNvPicPr>
+          <p:nvPr/>
+        </p:nvPicPr>
+        <p:blipFill>
+          <a:blip r:embed="rId2"/>
+          <a:stretch>
+            <a:fillRect/>
+          </a:stretch>
+        </p:blipFill>
+        <p:spPr bwMode="auto">
+          <a:xfrm>
+            <a:off x="901700" y="1600200"/>
+            <a:ext cx="7353300" cy="4013200"/>
+          </a:xfrm>
+          <a:prstGeom prst="rect">
+            <a:avLst/>
+          </a:prstGeom>
+          <a:noFill/>
+          <a:ln w="9525">
+            <a:noFill/>
+            <a:headEnd/>
+            <a:tailEnd/>
+          </a:ln>
+        </p:spPr>
+      </p:pic>
+      <p:sp>
+        <p:nvSpPr>
+          <p:cNvPr id="1" name="TextBox 3"/>
+          <p:cNvSpPr txBox="1"/>
+          <p:nvPr/>
+        </p:nvSpPr>
+        <p:spPr>
+          <a:xfrm>
+            <a:off x="457200" y="5613400"/>
+            <a:ext cx="8229600" cy="508000"/>
+          </a:xfrm>
+          <a:prstGeom prst="rect">
+            <a:avLst/>
+          </a:prstGeom>
+          <a:noFill/>
+        </p:spPr>
+        <p:txBody>
+          <a:bodyPr/>
+          <a:lstStyle/>
+          <a:p>
+            <a:pPr lvl="0" marL="0" indent="0" algn="ctr">
+              <a:buNone/>
+            </a:pPr>
+            <a:r>
+              <a:rPr/>
+              <a:t>pagedown</a:t>
+            </a:r>
+            <a:r>
+              <a:rPr/>
+              <a:t> </a:t>
+            </a:r>
+            <a:r>
+              <a:rPr/>
+              <a:t>readme</a:t>
+            </a:r>
+            <a:r>
+              <a:rPr/>
+              <a:t> </a:t>
+            </a:r>
+            <a:r>
+              <a:rPr/>
+              <a:t>file</a:t>
+            </a:r>
+          </a:p>
+        </p:txBody>
+      </p:sp>
+    </p:spTree>
+  </p:cSld>
+</p:sld>
+</file>
+
+<file path=ppt/slides/slide14.xml><?xml version="1.0" encoding="utf-8"?>
+<p:sld xmlns:a="http://schemas.openxmlformats.org/drawingml/2006/main" xmlns:r="http://schemas.openxmlformats.org/officeDocument/2006/relationships" xmlns:p="http://schemas.openxmlformats.org/presentationml/2006/main">
+  <p:cSld>
+    <p:spTree>
+      <p:nvGrpSpPr>
+        <p:cNvPr id="1" name=""/>
+        <p:cNvGrpSpPr/>
+        <p:nvPr/>
+      </p:nvGrpSpPr>
+      <p:grpSpPr>
+        <a:xfrm>
+          <a:off x="0" y="0"/>
+          <a:ext cx="0" cy="0"/>
+          <a:chOff x="0" y="0"/>
+          <a:chExt cx="0" cy="0"/>
+        </a:xfrm>
+      </p:grpSpPr>
+      <p:sp>
+        <p:nvSpPr>
+          <p:cNvPr id="2" name="Title 1"/>
+          <p:cNvSpPr>
+            <a:spLocks noGrp="1"/>
+          </p:cNvSpPr>
+          <p:nvPr>
+            <p:ph type="title"/>
+          </p:nvPr>
+        </p:nvSpPr>
+        <p:spPr/>
+        <p:txBody>
+          <a:bodyPr/>
+          <a:lstStyle/>
+          <a:p>
+            <a:pPr lvl="0" marL="0" indent="0">
+              <a:buNone/>
+            </a:pPr>
+            <a:r>
+              <a:rPr/>
+              <a:t>Why</a:t>
+            </a:r>
+            <a:r>
+              <a:rPr/>
+              <a:t> </a:t>
+            </a:r>
+            <a:r>
+              <a:rPr/>
+              <a:t>pagedown?</a:t>
+            </a:r>
+          </a:p>
+        </p:txBody>
+      </p:sp>
+      <p:sp>
+        <p:nvSpPr>
+          <p:cNvPr id="3" name="Content Placeholder 2"/>
+          <p:cNvSpPr>
+            <a:spLocks noGrp="1"/>
+          </p:cNvSpPr>
+          <p:nvPr>
+            <p:ph idx="1"/>
+          </p:nvPr>
+        </p:nvSpPr>
+        <p:spPr/>
+        <p:txBody>
+          <a:bodyPr/>
+          <a:lstStyle/>
+          <a:p>
+            <a:pPr lvl="1"/>
+            <a:r>
+              <a:rPr/>
+              <a:t>Paged</a:t>
+            </a:r>
+          </a:p>
+          <a:p>
+            <a:pPr lvl="1"/>
+            <a:r>
+              <a:rPr/>
+              <a:t>Features not found in knitr, bookdown</a:t>
+            </a:r>
+          </a:p>
+        </p:txBody>
+      </p:sp>
+    </p:spTree>
+  </p:cSld>
+</p:sld>
+</file>
+
 <file path=ppt/slides/slide2.xml><?xml version="1.0" encoding="utf-8"?>
 <p:sld xmlns:a="http://schemas.openxmlformats.org/drawingml/2006/main" xmlns:r="http://schemas.openxmlformats.org/officeDocument/2006/relationships" xmlns:p="http://schemas.openxmlformats.org/presentationml/2006/main">
   <p:cSld>
@@ -4469,6 +5063,123 @@
             <a:r>
               <a:rPr/>
               <a:t>Broman</a:t>
+            </a:r>
+          </a:p>
+        </p:txBody>
+      </p:sp>
+    </p:spTree>
+  </p:cSld>
+</p:sld>
+</file>
+
+<file path=ppt/slides/slide9.xml><?xml version="1.0" encoding="utf-8"?>
+<p:sld xmlns:a="http://schemas.openxmlformats.org/drawingml/2006/main" xmlns:r="http://schemas.openxmlformats.org/officeDocument/2006/relationships" xmlns:p="http://schemas.openxmlformats.org/presentationml/2006/main">
+  <p:cSld>
+    <p:spTree>
+      <p:nvGrpSpPr>
+        <p:cNvPr id="1" name=""/>
+        <p:cNvGrpSpPr/>
+        <p:nvPr/>
+      </p:nvGrpSpPr>
+      <p:grpSpPr>
+        <a:xfrm>
+          <a:off x="0" y="0"/>
+          <a:ext cx="0" cy="0"/>
+          <a:chOff x="0" y="0"/>
+          <a:chExt cx="0" cy="0"/>
+        </a:xfrm>
+      </p:grpSpPr>
+      <p:sp>
+        <p:nvSpPr>
+          <p:cNvPr id="2" name="Title 1"/>
+          <p:cNvSpPr>
+            <a:spLocks noGrp="1"/>
+          </p:cNvSpPr>
+          <p:nvPr>
+            <p:ph type="title"/>
+          </p:nvPr>
+        </p:nvSpPr>
+        <p:spPr/>
+        <p:txBody>
+          <a:bodyPr/>
+          <a:lstStyle/>
+          <a:p>
+            <a:pPr lvl="0" marL="0" indent="0">
+              <a:buNone/>
+            </a:pPr>
+            <a:r>
+              <a:rPr/>
+              <a:t>Yihui</a:t>
+            </a:r>
+            <a:r>
+              <a:rPr/>
+              <a:t> </a:t>
+            </a:r>
+            <a:r>
+              <a:rPr/>
+              <a:t>Xie’s</a:t>
+            </a:r>
+            <a:r>
+              <a:rPr/>
+              <a:t> </a:t>
+            </a:r>
+            <a:r>
+              <a:rPr/>
+              <a:t>major</a:t>
+            </a:r>
+            <a:r>
+              <a:rPr/>
+              <a:t> </a:t>
+            </a:r>
+            <a:r>
+              <a:rPr/>
+              <a:t>contributions</a:t>
+            </a:r>
+            <a:r>
+              <a:rPr/>
+              <a:t> </a:t>
+            </a:r>
+            <a:r>
+              <a:rPr/>
+              <a:t>to</a:t>
+            </a:r>
+            <a:r>
+              <a:rPr/>
+              <a:t> </a:t>
+            </a:r>
+            <a:r>
+              <a:rPr/>
+              <a:t>R</a:t>
+            </a:r>
+          </a:p>
+        </p:txBody>
+      </p:sp>
+      <p:sp>
+        <p:nvSpPr>
+          <p:cNvPr id="3" name="Content Placeholder 2"/>
+          <p:cNvSpPr>
+            <a:spLocks noGrp="1"/>
+          </p:cNvSpPr>
+          <p:nvPr>
+            <p:ph idx="1"/>
+          </p:nvPr>
+        </p:nvSpPr>
+        <p:spPr/>
+        <p:txBody>
+          <a:bodyPr/>
+          <a:lstStyle/>
+          <a:p>
+            <a:pPr lvl="1"/>
+            <a:r>
+              <a:rPr/>
+              <a:t>Using markdown language in creative ways</a:t>
+            </a:r>
+          </a:p>
+          <a:p>
+            <a:pPr lvl="1"/>
+            <a:r>
+              <a:rPr/>
+              <a:t>Successor to sweave</a:t>
             </a:r>
           </a:p>
         </p:txBody>

</xml_diff>

<commit_message>
Integrated text from poster-jacobs
</commit_message>
<xml_diff>
--- a/src/posters.pptx
+++ b/src/posters.pptx
@@ -19,6 +19,26 @@
     <p:sldId id="267" r:id="rId13"/>
     <p:sldId id="268" r:id="rId14"/>
     <p:sldId id="269" r:id="rId15"/>
+    <p:sldId id="270" r:id="rId16"/>
+    <p:sldId id="271" r:id="rId17"/>
+    <p:sldId id="272" r:id="rId18"/>
+    <p:sldId id="273" r:id="rId19"/>
+    <p:sldId id="274" r:id="rId20"/>
+    <p:sldId id="275" r:id="rId21"/>
+    <p:sldId id="276" r:id="rId22"/>
+    <p:sldId id="277" r:id="rId23"/>
+    <p:sldId id="278" r:id="rId24"/>
+    <p:sldId id="279" r:id="rId25"/>
+    <p:sldId id="280" r:id="rId26"/>
+    <p:sldId id="281" r:id="rId27"/>
+    <p:sldId id="282" r:id="rId28"/>
+    <p:sldId id="283" r:id="rId29"/>
+    <p:sldId id="284" r:id="rId30"/>
+    <p:sldId id="285" r:id="rId31"/>
+    <p:sldId id="286" r:id="rId32"/>
+    <p:sldId id="287" r:id="rId33"/>
+    <p:sldId id="288" r:id="rId34"/>
+    <p:sldId id="289" r:id="rId35"/>
   </p:sldIdLst>
   <p:sldSz cx="9144000" cy="6858000" type="screen4x3"/>
   <p:notesSz cx="6858000" cy="9144000"/>
@@ -3418,6 +3438,30 @@
               <a:rPr/>
               <a:t>Markdown</a:t>
             </a:r>
+            <a:r>
+              <a:rPr/>
+              <a:t> </a:t>
+            </a:r>
+            <a:r>
+              <a:rPr/>
+              <a:t>is</a:t>
+            </a:r>
+            <a:r>
+              <a:rPr/>
+              <a:t> </a:t>
+            </a:r>
+            <a:r>
+              <a:rPr/>
+              <a:t>the</a:t>
+            </a:r>
+            <a:r>
+              <a:rPr/>
+              <a:t> </a:t>
+            </a:r>
+            <a:r>
+              <a:rPr/>
+              <a:t>machinery</a:t>
+            </a:r>
           </a:p>
         </p:txBody>
       </p:sp>
@@ -3780,15 +3824,39 @@
             </a:pPr>
             <a:r>
               <a:rPr/>
-              <a:t>Why</a:t>
-            </a:r>
-            <a:r>
-              <a:rPr/>
-              <a:t> </a:t>
-            </a:r>
-            <a:r>
-              <a:rPr/>
-              <a:t>pagedown?</a:t>
+              <a:t>Features</a:t>
+            </a:r>
+            <a:r>
+              <a:rPr/>
+              <a:t> </a:t>
+            </a:r>
+            <a:r>
+              <a:rPr/>
+              <a:t>not</a:t>
+            </a:r>
+            <a:r>
+              <a:rPr/>
+              <a:t> </a:t>
+            </a:r>
+            <a:r>
+              <a:rPr/>
+              <a:t>found</a:t>
+            </a:r>
+            <a:r>
+              <a:rPr/>
+              <a:t> </a:t>
+            </a:r>
+            <a:r>
+              <a:rPr/>
+              <a:t>in</a:t>
+            </a:r>
+            <a:r>
+              <a:rPr/>
+              <a:t> </a:t>
+            </a:r>
+            <a:r>
+              <a:rPr/>
+              <a:t>knitr</a:t>
             </a:r>
           </a:p>
         </p:txBody>
@@ -3811,14 +3879,501 @@
             <a:pPr lvl="1"/>
             <a:r>
               <a:rPr/>
-              <a:t>Paged</a:t>
+              <a:t>Paged html files</a:t>
             </a:r>
           </a:p>
           <a:p>
             <a:pPr lvl="1"/>
             <a:r>
               <a:rPr/>
-              <a:t>Features not found in knitr, bookdown</a:t>
+              <a:t>Cascading Style Sheets (CSS)</a:t>
+            </a:r>
+          </a:p>
+          <a:p>
+            <a:pPr lvl="2"/>
+            <a:r>
+              <a:rPr/>
+              <a:t>Resume</a:t>
+            </a:r>
+          </a:p>
+          <a:p>
+            <a:pPr lvl="2"/>
+            <a:r>
+              <a:rPr/>
+              <a:t>Business card</a:t>
+            </a:r>
+          </a:p>
+          <a:p>
+            <a:pPr lvl="2"/>
+            <a:r>
+              <a:rPr/>
+              <a:t>Business letter</a:t>
+            </a:r>
+          </a:p>
+          <a:p>
+            <a:pPr lvl="2"/>
+            <a:r>
+              <a:rPr/>
+              <a:t>Poster</a:t>
+            </a:r>
+          </a:p>
+        </p:txBody>
+      </p:sp>
+    </p:spTree>
+  </p:cSld>
+</p:sld>
+</file>
+
+<file path=ppt/slides/slide15.xml><?xml version="1.0" encoding="utf-8"?>
+<p:sld xmlns:a="http://schemas.openxmlformats.org/drawingml/2006/main" xmlns:r="http://schemas.openxmlformats.org/officeDocument/2006/relationships" xmlns:p="http://schemas.openxmlformats.org/presentationml/2006/main">
+  <p:cSld>
+    <p:spTree>
+      <p:nvGrpSpPr>
+        <p:cNvPr id="1" name=""/>
+        <p:cNvGrpSpPr/>
+        <p:nvPr/>
+      </p:nvGrpSpPr>
+      <p:grpSpPr>
+        <a:xfrm>
+          <a:off x="0" y="0"/>
+          <a:ext cx="0" cy="0"/>
+          <a:chOff x="0" y="0"/>
+          <a:chExt cx="0" cy="0"/>
+        </a:xfrm>
+      </p:grpSpPr>
+      <p:sp>
+        <p:nvSpPr>
+          <p:cNvPr id="2" name="Title 1"/>
+          <p:cNvSpPr>
+            <a:spLocks noGrp="1"/>
+          </p:cNvSpPr>
+          <p:nvPr>
+            <p:ph type="title"/>
+          </p:nvPr>
+        </p:nvSpPr>
+        <p:spPr/>
+        <p:txBody>
+          <a:bodyPr/>
+          <a:lstStyle/>
+          <a:p>
+            <a:pPr lvl="0" marL="0" indent="0">
+              <a:buNone/>
+            </a:pPr>
+            <a:r>
+              <a:rPr/>
+              <a:t>poster-jacobs.css</a:t>
+            </a:r>
+          </a:p>
+        </p:txBody>
+      </p:sp>
+      <p:sp>
+        <p:nvSpPr>
+          <p:cNvPr id="3" name="Content Placeholder 2"/>
+          <p:cNvSpPr>
+            <a:spLocks noGrp="1"/>
+          </p:cNvSpPr>
+          <p:nvPr>
+            <p:ph idx="1"/>
+          </p:nvPr>
+        </p:nvSpPr>
+        <p:spPr/>
+        <p:txBody>
+          <a:bodyPr/>
+          <a:lstStyle/>
+          <a:p>
+            <a:pPr lvl="0" marL="1270000" indent="0">
+              <a:buNone/>
+            </a:pPr>
+            <a:r>
+              <a:rPr sz="1800">
+                <a:latin typeface="Courier"/>
+              </a:rPr>
+              <a:t>@page {
+  size: 46.8in 33.1in;
+  margin: 0;
+}
+* {
+  box-sizing: border-box;
+}
+html {
+  width: 46.8in;
+  height: 33.09in;
+}</a:t>
+            </a:r>
+          </a:p>
+        </p:txBody>
+      </p:sp>
+    </p:spTree>
+  </p:cSld>
+</p:sld>
+</file>
+
+<file path=ppt/slides/slide16.xml><?xml version="1.0" encoding="utf-8"?>
+<p:sld xmlns:a="http://schemas.openxmlformats.org/drawingml/2006/main" xmlns:r="http://schemas.openxmlformats.org/officeDocument/2006/relationships" xmlns:p="http://schemas.openxmlformats.org/presentationml/2006/main">
+  <p:cSld>
+    <p:spTree>
+      <p:nvGrpSpPr>
+        <p:cNvPr id="1" name=""/>
+        <p:cNvGrpSpPr/>
+        <p:nvPr/>
+      </p:nvGrpSpPr>
+      <p:grpSpPr>
+        <a:xfrm>
+          <a:off x="0" y="0"/>
+          <a:ext cx="0" cy="0"/>
+          <a:chOff x="0" y="0"/>
+          <a:chExt cx="0" cy="0"/>
+        </a:xfrm>
+      </p:grpSpPr>
+      <p:sp>
+        <p:nvSpPr>
+          <p:cNvPr id="2" name="Title 1"/>
+          <p:cNvSpPr>
+            <a:spLocks noGrp="1"/>
+          </p:cNvSpPr>
+          <p:nvPr>
+            <p:ph type="title"/>
+          </p:nvPr>
+        </p:nvSpPr>
+        <p:spPr/>
+        <p:txBody>
+          <a:bodyPr/>
+          <a:lstStyle/>
+          <a:p>
+            <a:pPr lvl="0" marL="0" indent="0">
+              <a:buNone/>
+            </a:pPr>
+            <a:r>
+              <a:rPr/>
+              <a:t>poster-jacobs.css</a:t>
+            </a:r>
+          </a:p>
+        </p:txBody>
+      </p:sp>
+      <p:sp>
+        <p:nvSpPr>
+          <p:cNvPr id="3" name="Content Placeholder 2"/>
+          <p:cNvSpPr>
+            <a:spLocks noGrp="1"/>
+          </p:cNvSpPr>
+          <p:nvPr>
+            <p:ph idx="1"/>
+          </p:nvPr>
+        </p:nvSpPr>
+        <p:spPr/>
+        <p:txBody>
+          <a:bodyPr/>
+          <a:lstStyle/>
+          <a:p>
+            <a:pPr lvl="0" marL="1270000" indent="0">
+              <a:buNone/>
+            </a:pPr>
+            <a:r>
+              <a:rPr sz="1800">
+                <a:latin typeface="Courier"/>
+              </a:rPr>
+              <a:t>body {
+  margin: 0;
+  font-size: 32px;
+  width: 100%;
+  height: 99.9%;
+  grid-gap: 1.2in;
+  padding: 1.2in;
+  font-family: Optima, Calibri, sans-serif;
+}</a:t>
+            </a:r>
+          </a:p>
+        </p:txBody>
+      </p:sp>
+    </p:spTree>
+  </p:cSld>
+</p:sld>
+</file>
+
+<file path=ppt/slides/slide17.xml><?xml version="1.0" encoding="utf-8"?>
+<p:sld xmlns:a="http://schemas.openxmlformats.org/drawingml/2006/main" xmlns:r="http://schemas.openxmlformats.org/officeDocument/2006/relationships" xmlns:p="http://schemas.openxmlformats.org/presentationml/2006/main">
+  <p:cSld>
+    <p:spTree>
+      <p:nvGrpSpPr>
+        <p:cNvPr id="1" name=""/>
+        <p:cNvGrpSpPr/>
+        <p:nvPr/>
+      </p:nvGrpSpPr>
+      <p:grpSpPr>
+        <a:xfrm>
+          <a:off x="0" y="0"/>
+          <a:ext cx="0" cy="0"/>
+          <a:chOff x="0" y="0"/>
+          <a:chExt cx="0" cy="0"/>
+        </a:xfrm>
+      </p:grpSpPr>
+      <p:sp>
+        <p:nvSpPr>
+          <p:cNvPr id="2" name="Title 1"/>
+          <p:cNvSpPr>
+            <a:spLocks noGrp="1"/>
+          </p:cNvSpPr>
+          <p:nvPr>
+            <p:ph type="title"/>
+          </p:nvPr>
+        </p:nvSpPr>
+        <p:spPr/>
+        <p:txBody>
+          <a:bodyPr/>
+          <a:lstStyle/>
+          <a:p>
+            <a:pPr lvl="0" marL="0" indent="0">
+              <a:buNone/>
+            </a:pPr>
+            <a:r>
+              <a:rPr/>
+              <a:t>poster-jacobs.css</a:t>
+            </a:r>
+          </a:p>
+        </p:txBody>
+      </p:sp>
+      <p:sp>
+        <p:nvSpPr>
+          <p:cNvPr id="3" name="Content Placeholder 2"/>
+          <p:cNvSpPr>
+            <a:spLocks noGrp="1"/>
+          </p:cNvSpPr>
+          <p:nvPr>
+            <p:ph idx="1"/>
+          </p:nvPr>
+        </p:nvSpPr>
+        <p:spPr/>
+        <p:txBody>
+          <a:bodyPr/>
+          <a:lstStyle/>
+          <a:p>
+            <a:pPr lvl="0" marL="1270000" indent="0">
+              <a:buNone/>
+            </a:pPr>
+            <a:r>
+              <a:rPr sz="1800">
+                <a:latin typeface="Courier"/>
+              </a:rPr>
+              <a:t>body {
+  display: grid;
+  grid-template-areas:
+    'S1 S1 S1 S1'
+    'S2 S4 S5 S9'
+    'S2 S4 S5 S9'
+    'S2 S4 S5 S9'
+    'S2 S6 S6 S10'
+    'S3 S7 S8 S11'
+    'S3 S7 S8 S11'
+    'S3 S7 S8 S11'
+    'S3 S7 S8 S12'
+    'S3 S7 S8 S12';
+  grid-template-columns: repeat(4, 1fr);
+  grid-template-rows: repeat(10, 1fr);
+}</a:t>
+            </a:r>
+          </a:p>
+        </p:txBody>
+      </p:sp>
+    </p:spTree>
+  </p:cSld>
+</p:sld>
+</file>
+
+<file path=ppt/slides/slide18.xml><?xml version="1.0" encoding="utf-8"?>
+<p:sld xmlns:a="http://schemas.openxmlformats.org/drawingml/2006/main" xmlns:r="http://schemas.openxmlformats.org/officeDocument/2006/relationships" xmlns:p="http://schemas.openxmlformats.org/presentationml/2006/main">
+  <p:cSld>
+    <p:spTree>
+      <p:nvGrpSpPr>
+        <p:cNvPr id="1" name=""/>
+        <p:cNvGrpSpPr/>
+        <p:nvPr/>
+      </p:nvGrpSpPr>
+      <p:grpSpPr>
+        <a:xfrm>
+          <a:off x="0" y="0"/>
+          <a:ext cx="0" cy="0"/>
+          <a:chOff x="0" y="0"/>
+          <a:chExt cx="0" cy="0"/>
+        </a:xfrm>
+      </p:grpSpPr>
+      <p:sp>
+        <p:nvSpPr>
+          <p:cNvPr id="2" name="Title 1"/>
+          <p:cNvSpPr>
+            <a:spLocks noGrp="1"/>
+          </p:cNvSpPr>
+          <p:nvPr>
+            <p:ph type="title"/>
+          </p:nvPr>
+        </p:nvSpPr>
+        <p:spPr/>
+        <p:txBody>
+          <a:bodyPr/>
+          <a:lstStyle/>
+          <a:p>
+            <a:pPr lvl="0" marL="0" indent="0">
+              <a:buNone/>
+            </a:pPr>
+            <a:r>
+              <a:rPr/>
+              <a:t>poster-jacobs.css</a:t>
+            </a:r>
+          </a:p>
+        </p:txBody>
+      </p:sp>
+      <p:sp>
+        <p:nvSpPr>
+          <p:cNvPr id="3" name="Content Placeholder 2"/>
+          <p:cNvSpPr>
+            <a:spLocks noGrp="1"/>
+          </p:cNvSpPr>
+          <p:nvPr>
+            <p:ph idx="1"/>
+          </p:nvPr>
+        </p:nvSpPr>
+        <p:spPr/>
+        <p:txBody>
+          <a:bodyPr/>
+          <a:lstStyle/>
+          <a:p>
+            <a:pPr lvl="0" marL="1270000" indent="0">
+              <a:buNone/>
+            </a:pPr>
+            <a:r>
+              <a:rPr sz="1800">
+                <a:latin typeface="Courier"/>
+              </a:rPr>
+              <a:t>.section-1 { grid-area: S1; }
+.section-2 { grid-area: S2; }
+.section-3 { grid-area: S3; }
+.section-4 { grid-area: S4; }
+.section-5 { grid-area: S5; }
+.section-6 { grid-area: S6; }
+.section-7 { grid-area: S7; }
+.section-8 { grid-area: S8; }
+.section-9 { grid-area: S9; }
+.section-10 { grid-area: S10; }
+.section-11 { grid-area: S11; }
+.section-12 { grid-area: S12; }
+</a:t>
+            </a:r>
+          </a:p>
+        </p:txBody>
+      </p:sp>
+    </p:spTree>
+  </p:cSld>
+</p:sld>
+</file>
+
+<file path=ppt/slides/slide19.xml><?xml version="1.0" encoding="utf-8"?>
+<p:sld xmlns:a="http://schemas.openxmlformats.org/drawingml/2006/main" xmlns:r="http://schemas.openxmlformats.org/officeDocument/2006/relationships" xmlns:p="http://schemas.openxmlformats.org/presentationml/2006/main">
+  <p:cSld>
+    <p:spTree>
+      <p:nvGrpSpPr>
+        <p:cNvPr id="1" name=""/>
+        <p:cNvGrpSpPr/>
+        <p:nvPr/>
+      </p:nvGrpSpPr>
+      <p:grpSpPr>
+        <a:xfrm>
+          <a:off x="0" y="0"/>
+          <a:ext cx="0" cy="0"/>
+          <a:chOff x="0" y="0"/>
+          <a:chExt cx="0" cy="0"/>
+        </a:xfrm>
+      </p:grpSpPr>
+      <p:sp>
+        <p:nvSpPr>
+          <p:cNvPr id="2" name="Title 1"/>
+          <p:cNvSpPr>
+            <a:spLocks noGrp="1"/>
+          </p:cNvSpPr>
+          <p:nvPr>
+            <p:ph type="title"/>
+          </p:nvPr>
+        </p:nvSpPr>
+        <p:spPr/>
+        <p:txBody>
+          <a:bodyPr/>
+          <a:lstStyle/>
+          <a:p>
+            <a:pPr lvl="0" marL="0" indent="0">
+              <a:buNone/>
+            </a:pPr>
+            <a:r>
+              <a:rPr/>
+              <a:t>poster-jacobs.Rmd,</a:t>
+            </a:r>
+            <a:r>
+              <a:rPr/>
+              <a:t> </a:t>
+            </a:r>
+            <a:r>
+              <a:rPr/>
+              <a:t>yaml</a:t>
+            </a:r>
+            <a:r>
+              <a:rPr/>
+              <a:t> </a:t>
+            </a:r>
+            <a:r>
+              <a:rPr/>
+              <a:t>header</a:t>
+            </a:r>
+            <a:r>
+              <a:rPr/>
+              <a:t> </a:t>
+            </a:r>
+            <a:r>
+              <a:rPr/>
+              <a:t>(1</a:t>
+            </a:r>
+            <a:r>
+              <a:rPr/>
+              <a:t> </a:t>
+            </a:r>
+            <a:r>
+              <a:rPr/>
+              <a:t>of</a:t>
+            </a:r>
+            <a:r>
+              <a:rPr/>
+              <a:t> </a:t>
+            </a:r>
+            <a:r>
+              <a:rPr/>
+              <a:t>4)</a:t>
+            </a:r>
+          </a:p>
+        </p:txBody>
+      </p:sp>
+      <p:sp>
+        <p:nvSpPr>
+          <p:cNvPr id="3" name="Content Placeholder 2"/>
+          <p:cNvSpPr>
+            <a:spLocks noGrp="1"/>
+          </p:cNvSpPr>
+          <p:nvPr>
+            <p:ph idx="1"/>
+          </p:nvPr>
+        </p:nvSpPr>
+        <p:spPr/>
+        <p:txBody>
+          <a:bodyPr/>
+          <a:lstStyle/>
+          <a:p>
+            <a:pPr lvl="0" marL="1270000" indent="0">
+              <a:buNone/>
+            </a:pPr>
+            <a:r>
+              <a:rPr sz="1800">
+                <a:latin typeface="Courier"/>
+              </a:rPr>
+              <a:t>---
+title: "Unnecessarily Complicated Research Title"
+author: "John Smith^1^, James Smith^1,2^, and Jane Smith^3^"
+institute: "1. Department and University One; 2. Department and University Two; 3. Department and University Three"
+date: "2018-11-30"</a:t>
             </a:r>
           </a:p>
         </p:txBody>
@@ -3996,6 +4551,1123 @@
 </p:sld>
 </file>
 
+<file path=ppt/slides/slide20.xml><?xml version="1.0" encoding="utf-8"?>
+<p:sld xmlns:a="http://schemas.openxmlformats.org/drawingml/2006/main" xmlns:r="http://schemas.openxmlformats.org/officeDocument/2006/relationships" xmlns:p="http://schemas.openxmlformats.org/presentationml/2006/main">
+  <p:cSld>
+    <p:spTree>
+      <p:nvGrpSpPr>
+        <p:cNvPr id="1" name=""/>
+        <p:cNvGrpSpPr/>
+        <p:nvPr/>
+      </p:nvGrpSpPr>
+      <p:grpSpPr>
+        <a:xfrm>
+          <a:off x="0" y="0"/>
+          <a:ext cx="0" cy="0"/>
+          <a:chOff x="0" y="0"/>
+          <a:chExt cx="0" cy="0"/>
+        </a:xfrm>
+      </p:grpSpPr>
+      <p:sp>
+        <p:nvSpPr>
+          <p:cNvPr id="2" name="Title 1"/>
+          <p:cNvSpPr>
+            <a:spLocks noGrp="1"/>
+          </p:cNvSpPr>
+          <p:nvPr>
+            <p:ph type="title"/>
+          </p:nvPr>
+        </p:nvSpPr>
+        <p:spPr/>
+        <p:txBody>
+          <a:bodyPr/>
+          <a:lstStyle/>
+          <a:p>
+            <a:pPr lvl="0" marL="0" indent="0">
+              <a:buNone/>
+            </a:pPr>
+            <a:r>
+              <a:rPr/>
+              <a:t>poster-jacobs.Rmd,</a:t>
+            </a:r>
+            <a:r>
+              <a:rPr/>
+              <a:t> </a:t>
+            </a:r>
+            <a:r>
+              <a:rPr/>
+              <a:t>yaml</a:t>
+            </a:r>
+            <a:r>
+              <a:rPr/>
+              <a:t> </a:t>
+            </a:r>
+            <a:r>
+              <a:rPr/>
+              <a:t>header</a:t>
+            </a:r>
+            <a:r>
+              <a:rPr/>
+              <a:t> </a:t>
+            </a:r>
+            <a:r>
+              <a:rPr/>
+              <a:t>(2</a:t>
+            </a:r>
+            <a:r>
+              <a:rPr/>
+              <a:t> </a:t>
+            </a:r>
+            <a:r>
+              <a:rPr/>
+              <a:t>of</a:t>
+            </a:r>
+            <a:r>
+              <a:rPr/>
+              <a:t> </a:t>
+            </a:r>
+            <a:r>
+              <a:rPr/>
+              <a:t>4)</a:t>
+            </a:r>
+          </a:p>
+        </p:txBody>
+      </p:sp>
+      <p:sp>
+        <p:nvSpPr>
+          <p:cNvPr id="3" name="Content Placeholder 2"/>
+          <p:cNvSpPr>
+            <a:spLocks noGrp="1"/>
+          </p:cNvSpPr>
+          <p:nvPr>
+            <p:ph idx="1"/>
+          </p:nvPr>
+        </p:nvSpPr>
+        <p:spPr/>
+        <p:txBody>
+          <a:bodyPr/>
+          <a:lstStyle/>
+          <a:p>
+            <a:pPr lvl="0" marL="1270000" indent="0">
+              <a:buNone/>
+            </a:pPr>
+            <a:r>
+              <a:rPr sz="1800">
+                <a:latin typeface="Courier"/>
+              </a:rPr>
+              <a:t>references:
+  - id: R-base
+    author:
+    - family: "R Core Team"
+      given: ""
+    title: 'R: A Language and Environment for Statistical Computing'
+    issued:
+      year: 2018
+    URL: https://www.r-project.org</a:t>
+            </a:r>
+          </a:p>
+        </p:txBody>
+      </p:sp>
+    </p:spTree>
+  </p:cSld>
+</p:sld>
+</file>
+
+<file path=ppt/slides/slide21.xml><?xml version="1.0" encoding="utf-8"?>
+<p:sld xmlns:a="http://schemas.openxmlformats.org/drawingml/2006/main" xmlns:r="http://schemas.openxmlformats.org/officeDocument/2006/relationships" xmlns:p="http://schemas.openxmlformats.org/presentationml/2006/main">
+  <p:cSld>
+    <p:spTree>
+      <p:nvGrpSpPr>
+        <p:cNvPr id="1" name=""/>
+        <p:cNvGrpSpPr/>
+        <p:nvPr/>
+      </p:nvGrpSpPr>
+      <p:grpSpPr>
+        <a:xfrm>
+          <a:off x="0" y="0"/>
+          <a:ext cx="0" cy="0"/>
+          <a:chOff x="0" y="0"/>
+          <a:chExt cx="0" cy="0"/>
+        </a:xfrm>
+      </p:grpSpPr>
+      <p:sp>
+        <p:nvSpPr>
+          <p:cNvPr id="2" name="Title 1"/>
+          <p:cNvSpPr>
+            <a:spLocks noGrp="1"/>
+          </p:cNvSpPr>
+          <p:nvPr>
+            <p:ph type="title"/>
+          </p:nvPr>
+        </p:nvSpPr>
+        <p:spPr/>
+        <p:txBody>
+          <a:bodyPr/>
+          <a:lstStyle/>
+          <a:p>
+            <a:pPr lvl="0" marL="0" indent="0">
+              <a:buNone/>
+            </a:pPr>
+            <a:r>
+              <a:rPr/>
+              <a:t>poster-jacobs.Rmd,</a:t>
+            </a:r>
+            <a:r>
+              <a:rPr/>
+              <a:t> </a:t>
+            </a:r>
+            <a:r>
+              <a:rPr/>
+              <a:t>yaml</a:t>
+            </a:r>
+            <a:r>
+              <a:rPr/>
+              <a:t> </a:t>
+            </a:r>
+            <a:r>
+              <a:rPr/>
+              <a:t>header</a:t>
+            </a:r>
+            <a:r>
+              <a:rPr/>
+              <a:t> </a:t>
+            </a:r>
+            <a:r>
+              <a:rPr/>
+              <a:t>(3</a:t>
+            </a:r>
+            <a:r>
+              <a:rPr/>
+              <a:t> </a:t>
+            </a:r>
+            <a:r>
+              <a:rPr/>
+              <a:t>of</a:t>
+            </a:r>
+            <a:r>
+              <a:rPr/>
+              <a:t> </a:t>
+            </a:r>
+            <a:r>
+              <a:rPr/>
+              <a:t>4)</a:t>
+            </a:r>
+          </a:p>
+        </p:txBody>
+      </p:sp>
+      <p:sp>
+        <p:nvSpPr>
+          <p:cNvPr id="3" name="Content Placeholder 2"/>
+          <p:cNvSpPr>
+            <a:spLocks noGrp="1"/>
+          </p:cNvSpPr>
+          <p:nvPr>
+            <p:ph idx="1"/>
+          </p:nvPr>
+        </p:nvSpPr>
+        <p:spPr/>
+        <p:txBody>
+          <a:bodyPr/>
+          <a:lstStyle/>
+          <a:p>
+            <a:pPr lvl="0" marL="1270000" indent="0">
+              <a:buNone/>
+            </a:pPr>
+            <a:r>
+              <a:rPr sz="1800">
+                <a:latin typeface="Courier"/>
+              </a:rPr>
+              <a:t>  - id: R-pagedown
+    author:
+    - family: Xie
+      given: Yihui
+    - family: Lesur
+      given: Romain
+    title: 'Paginate the HTML Output of R Markdown with CSS for Print'
+    issued:
+      year: 2018
+    URL: https://github.com/rstudio/pagedown</a:t>
+            </a:r>
+          </a:p>
+        </p:txBody>
+      </p:sp>
+    </p:spTree>
+  </p:cSld>
+</p:sld>
+</file>
+
+<file path=ppt/slides/slide22.xml><?xml version="1.0" encoding="utf-8"?>
+<p:sld xmlns:a="http://schemas.openxmlformats.org/drawingml/2006/main" xmlns:r="http://schemas.openxmlformats.org/officeDocument/2006/relationships" xmlns:p="http://schemas.openxmlformats.org/presentationml/2006/main">
+  <p:cSld>
+    <p:spTree>
+      <p:nvGrpSpPr>
+        <p:cNvPr id="1" name=""/>
+        <p:cNvGrpSpPr/>
+        <p:nvPr/>
+      </p:nvGrpSpPr>
+      <p:grpSpPr>
+        <a:xfrm>
+          <a:off x="0" y="0"/>
+          <a:ext cx="0" cy="0"/>
+          <a:chOff x="0" y="0"/>
+          <a:chExt cx="0" cy="0"/>
+        </a:xfrm>
+      </p:grpSpPr>
+      <p:sp>
+        <p:nvSpPr>
+          <p:cNvPr id="2" name="Title 1"/>
+          <p:cNvSpPr>
+            <a:spLocks noGrp="1"/>
+          </p:cNvSpPr>
+          <p:nvPr>
+            <p:ph type="title"/>
+          </p:nvPr>
+        </p:nvSpPr>
+        <p:spPr/>
+        <p:txBody>
+          <a:bodyPr/>
+          <a:lstStyle/>
+          <a:p>
+            <a:pPr lvl="0" marL="0" indent="0">
+              <a:buNone/>
+            </a:pPr>
+            <a:r>
+              <a:rPr/>
+              <a:t>poster-jacobs.Rmd,</a:t>
+            </a:r>
+            <a:r>
+              <a:rPr/>
+              <a:t> </a:t>
+            </a:r>
+            <a:r>
+              <a:rPr/>
+              <a:t>yaml</a:t>
+            </a:r>
+            <a:r>
+              <a:rPr/>
+              <a:t> </a:t>
+            </a:r>
+            <a:r>
+              <a:rPr/>
+              <a:t>header</a:t>
+            </a:r>
+            <a:r>
+              <a:rPr/>
+              <a:t> </a:t>
+            </a:r>
+            <a:r>
+              <a:rPr/>
+              <a:t>(4</a:t>
+            </a:r>
+            <a:r>
+              <a:rPr/>
+              <a:t> </a:t>
+            </a:r>
+            <a:r>
+              <a:rPr/>
+              <a:t>of</a:t>
+            </a:r>
+            <a:r>
+              <a:rPr/>
+              <a:t> </a:t>
+            </a:r>
+            <a:r>
+              <a:rPr/>
+              <a:t>4)</a:t>
+            </a:r>
+          </a:p>
+        </p:txBody>
+      </p:sp>
+      <p:sp>
+        <p:nvSpPr>
+          <p:cNvPr id="3" name="Content Placeholder 2"/>
+          <p:cNvSpPr>
+            <a:spLocks noGrp="1"/>
+          </p:cNvSpPr>
+          <p:nvPr>
+            <p:ph idx="1"/>
+          </p:nvPr>
+        </p:nvSpPr>
+        <p:spPr/>
+        <p:txBody>
+          <a:bodyPr/>
+          <a:lstStyle/>
+          <a:p>
+            <a:pPr lvl="0" marL="1270000" indent="0">
+              <a:buNone/>
+            </a:pPr>
+            <a:r>
+              <a:rPr sz="1800">
+                <a:latin typeface="Courier"/>
+              </a:rPr>
+              <a:t>output:
+  pagedown::poster_jacobs:
+    self_contained: false
+    pandoc_args: --mathjax
+---
+</a:t>
+            </a:r>
+          </a:p>
+        </p:txBody>
+      </p:sp>
+    </p:spTree>
+  </p:cSld>
+</p:sld>
+</file>
+
+<file path=ppt/slides/slide23.xml><?xml version="1.0" encoding="utf-8"?>
+<p:sld xmlns:a="http://schemas.openxmlformats.org/drawingml/2006/main" xmlns:r="http://schemas.openxmlformats.org/officeDocument/2006/relationships" xmlns:p="http://schemas.openxmlformats.org/presentationml/2006/main">
+  <p:cSld>
+    <p:spTree>
+      <p:nvGrpSpPr>
+        <p:cNvPr id="1" name=""/>
+        <p:cNvGrpSpPr/>
+        <p:nvPr/>
+      </p:nvGrpSpPr>
+      <p:grpSpPr>
+        <a:xfrm>
+          <a:off x="0" y="0"/>
+          <a:ext cx="0" cy="0"/>
+          <a:chOff x="0" y="0"/>
+          <a:chExt cx="0" cy="0"/>
+        </a:xfrm>
+      </p:grpSpPr>
+      <p:sp>
+        <p:nvSpPr>
+          <p:cNvPr id="2" name="Title 1"/>
+          <p:cNvSpPr>
+            <a:spLocks noGrp="1"/>
+          </p:cNvSpPr>
+          <p:nvPr>
+            <p:ph type="title"/>
+          </p:nvPr>
+        </p:nvSpPr>
+        <p:spPr/>
+        <p:txBody>
+          <a:bodyPr/>
+          <a:lstStyle/>
+          <a:p>
+            <a:pPr lvl="0" marL="0" indent="0">
+              <a:buNone/>
+            </a:pPr>
+            <a:r>
+              <a:rPr/>
+              <a:t>poster-jacobs.Rmd,</a:t>
+            </a:r>
+            <a:r>
+              <a:rPr/>
+              <a:t> </a:t>
+            </a:r>
+            <a:r>
+              <a:rPr/>
+              <a:t>default</a:t>
+            </a:r>
+            <a:r>
+              <a:rPr/>
+              <a:t> </a:t>
+            </a:r>
+            <a:r>
+              <a:rPr/>
+              <a:t>h1</a:t>
+            </a:r>
+          </a:p>
+        </p:txBody>
+      </p:sp>
+      <p:sp>
+        <p:nvSpPr>
+          <p:cNvPr id="3" name="Content Placeholder 2"/>
+          <p:cNvSpPr>
+            <a:spLocks noGrp="1"/>
+          </p:cNvSpPr>
+          <p:nvPr>
+            <p:ph idx="1"/>
+          </p:nvPr>
+        </p:nvSpPr>
+        <p:spPr/>
+        <p:txBody>
+          <a:bodyPr/>
+          <a:lstStyle/>
+          <a:p>
+            <a:pPr lvl="0" marL="1270000" indent="0">
+              <a:buNone/>
+            </a:pPr>
+            <a:r>
+              <a:rPr sz="1800">
+                <a:latin typeface="Courier"/>
+              </a:rPr>
+              <a:t>Introduction
+================================================================================
+Lorem ipsum dolor **sit amet**, consectetur adipiscing elit. Donec ut volutpat elit. Sed laoreet accumsan mattis. Integer sapien tellus, auctor ac blandit eget, sollicitudin vitae lorem. Praesent dictum tempor pulvinar. Suspendisse potenti. Sed tincidunt varius ipsum, et porta nulla suscipit et. Etiam congue bibendum felis, ac dictum augue cursus a. **Donec** magna eros, iaculis sit amet placerat quis, laoreet id est.</a:t>
+            </a:r>
+          </a:p>
+        </p:txBody>
+      </p:sp>
+    </p:spTree>
+  </p:cSld>
+</p:sld>
+</file>
+
+<file path=ppt/slides/slide24.xml><?xml version="1.0" encoding="utf-8"?>
+<p:sld xmlns:a="http://schemas.openxmlformats.org/drawingml/2006/main" xmlns:r="http://schemas.openxmlformats.org/officeDocument/2006/relationships" xmlns:p="http://schemas.openxmlformats.org/presentationml/2006/main">
+  <p:cSld>
+    <p:spTree>
+      <p:nvGrpSpPr>
+        <p:cNvPr id="1" name=""/>
+        <p:cNvGrpSpPr/>
+        <p:nvPr/>
+      </p:nvGrpSpPr>
+      <p:grpSpPr>
+        <a:xfrm>
+          <a:off x="0" y="0"/>
+          <a:ext cx="0" cy="0"/>
+          <a:chOff x="0" y="0"/>
+          <a:chExt cx="0" cy="0"/>
+        </a:xfrm>
+      </p:grpSpPr>
+      <p:sp>
+        <p:nvSpPr>
+          <p:cNvPr id="2" name="Title 1"/>
+          <p:cNvSpPr>
+            <a:spLocks noGrp="1"/>
+          </p:cNvSpPr>
+          <p:nvPr>
+            <p:ph type="title"/>
+          </p:nvPr>
+        </p:nvSpPr>
+        <p:spPr/>
+        <p:txBody>
+          <a:bodyPr/>
+          <a:lstStyle/>
+          <a:p>
+            <a:pPr lvl="0" marL="0" indent="0">
+              <a:buNone/>
+            </a:pPr>
+            <a:r>
+              <a:rPr/>
+              <a:t>poster-jacobs.css,</a:t>
+            </a:r>
+            <a:r>
+              <a:rPr/>
+              <a:t> </a:t>
+            </a:r>
+            <a:r>
+              <a:rPr/>
+              <a:t>default</a:t>
+            </a:r>
+            <a:r>
+              <a:rPr/>
+              <a:t> </a:t>
+            </a:r>
+            <a:r>
+              <a:rPr/>
+              <a:t>h1</a:t>
+            </a:r>
+          </a:p>
+        </p:txBody>
+      </p:sp>
+      <p:sp>
+        <p:nvSpPr>
+          <p:cNvPr id="3" name="Content Placeholder 2"/>
+          <p:cNvSpPr>
+            <a:spLocks noGrp="1"/>
+          </p:cNvSpPr>
+          <p:nvPr>
+            <p:ph idx="1"/>
+          </p:nvPr>
+        </p:nvSpPr>
+        <p:spPr/>
+        <p:txBody>
+          <a:bodyPr/>
+          <a:lstStyle/>
+          <a:p>
+            <a:pPr lvl="0" marL="1270000" indent="0">
+              <a:buNone/>
+            </a:pPr>
+            <a:r>
+              <a:rPr sz="1800">
+                <a:latin typeface="Courier"/>
+              </a:rPr>
+              <a:t>h1 {
+  color: limegreen;
+  margin: 0;
+  padding: .5em;
+  font-size: 1.5em;
+}
+h1 hr {
+  border: 6px solid gray;
+  clip-path: ellipse(50% 3px at center);
+  margin: 0;
+}</a:t>
+            </a:r>
+          </a:p>
+        </p:txBody>
+      </p:sp>
+    </p:spTree>
+  </p:cSld>
+</p:sld>
+</file>
+
+<file path=ppt/slides/slide25.xml><?xml version="1.0" encoding="utf-8"?>
+<p:sld xmlns:a="http://schemas.openxmlformats.org/drawingml/2006/main" xmlns:r="http://schemas.openxmlformats.org/officeDocument/2006/relationships" xmlns:p="http://schemas.openxmlformats.org/presentationml/2006/main">
+  <p:cSld>
+    <p:spTree>
+      <p:nvGrpSpPr>
+        <p:cNvPr id="1" name=""/>
+        <p:cNvGrpSpPr/>
+        <p:nvPr/>
+      </p:nvGrpSpPr>
+      <p:grpSpPr>
+        <a:xfrm>
+          <a:off x="0" y="0"/>
+          <a:ext cx="0" cy="0"/>
+          <a:chOff x="0" y="0"/>
+          <a:chExt cx="0" cy="0"/>
+        </a:xfrm>
+      </p:grpSpPr>
+      <p:sp>
+        <p:nvSpPr>
+          <p:cNvPr id="2" name="Title 1"/>
+          <p:cNvSpPr>
+            <a:spLocks noGrp="1"/>
+          </p:cNvSpPr>
+          <p:nvPr>
+            <p:ph type="title"/>
+          </p:nvPr>
+        </p:nvSpPr>
+        <p:spPr/>
+        <p:txBody>
+          <a:bodyPr/>
+          <a:lstStyle/>
+          <a:p>
+            <a:pPr lvl="0" marL="0" indent="0">
+              <a:buNone/>
+            </a:pPr>
+            <a:r>
+              <a:rPr/>
+              <a:t>poster-jacobs.html,</a:t>
+            </a:r>
+            <a:r>
+              <a:rPr/>
+              <a:t> </a:t>
+            </a:r>
+            <a:r>
+              <a:rPr/>
+              <a:t>default</a:t>
+            </a:r>
+            <a:r>
+              <a:rPr/>
+              <a:t> </a:t>
+            </a:r>
+            <a:r>
+              <a:rPr/>
+              <a:t>h1</a:t>
+            </a:r>
+          </a:p>
+        </p:txBody>
+      </p:sp>
+      <p:pic>
+        <p:nvPicPr>
+          <p:cNvPr descr="../images/introduction.png" id="0" name="Picture 1"/>
+          <p:cNvPicPr>
+            <a:picLocks noGrp="1" noChangeAspect="1"/>
+          </p:cNvPicPr>
+          <p:nvPr/>
+        </p:nvPicPr>
+        <p:blipFill>
+          <a:blip r:embed="rId2"/>
+          <a:stretch>
+            <a:fillRect/>
+          </a:stretch>
+        </p:blipFill>
+        <p:spPr bwMode="auto">
+          <a:xfrm>
+            <a:off x="2679700" y="1600200"/>
+            <a:ext cx="3771900" cy="4013200"/>
+          </a:xfrm>
+          <a:prstGeom prst="rect">
+            <a:avLst/>
+          </a:prstGeom>
+          <a:noFill/>
+          <a:ln w="9525">
+            <a:noFill/>
+            <a:headEnd/>
+            <a:tailEnd/>
+          </a:ln>
+        </p:spPr>
+      </p:pic>
+      <p:sp>
+        <p:nvSpPr>
+          <p:cNvPr id="1" name="TextBox 3"/>
+          <p:cNvSpPr txBox="1"/>
+          <p:nvPr/>
+        </p:nvSpPr>
+        <p:spPr>
+          <a:xfrm>
+            <a:off x="457200" y="5613400"/>
+            <a:ext cx="8229600" cy="508000"/>
+          </a:xfrm>
+          <a:prstGeom prst="rect">
+            <a:avLst/>
+          </a:prstGeom>
+          <a:noFill/>
+        </p:spPr>
+        <p:txBody>
+          <a:bodyPr/>
+          <a:lstStyle/>
+          <a:p>
+            <a:pPr lvl="0" marL="0" indent="0" algn="ctr">
+              <a:buNone/>
+            </a:pPr>
+            <a:r>
+              <a:rPr/>
+              <a:t>Introduction</a:t>
+            </a:r>
+            <a:r>
+              <a:rPr/>
+              <a:t> </a:t>
+            </a:r>
+            <a:r>
+              <a:rPr/>
+              <a:t>section</a:t>
+            </a:r>
+            <a:r>
+              <a:rPr/>
+              <a:t> </a:t>
+            </a:r>
+            <a:r>
+              <a:rPr/>
+              <a:t>of</a:t>
+            </a:r>
+            <a:r>
+              <a:rPr/>
+              <a:t> </a:t>
+            </a:r>
+            <a:r>
+              <a:rPr/>
+              <a:t>poster</a:t>
+            </a:r>
+          </a:p>
+        </p:txBody>
+      </p:sp>
+    </p:spTree>
+  </p:cSld>
+</p:sld>
+</file>
+
+<file path=ppt/slides/slide26.xml><?xml version="1.0" encoding="utf-8"?>
+<p:sld xmlns:a="http://schemas.openxmlformats.org/drawingml/2006/main" xmlns:r="http://schemas.openxmlformats.org/officeDocument/2006/relationships" xmlns:p="http://schemas.openxmlformats.org/presentationml/2006/main">
+  <p:cSld>
+    <p:spTree>
+      <p:nvGrpSpPr>
+        <p:cNvPr id="1" name=""/>
+        <p:cNvGrpSpPr/>
+        <p:nvPr/>
+      </p:nvGrpSpPr>
+      <p:grpSpPr>
+        <a:xfrm>
+          <a:off x="0" y="0"/>
+          <a:ext cx="0" cy="0"/>
+          <a:chOff x="0" y="0"/>
+          <a:chExt cx="0" cy="0"/>
+        </a:xfrm>
+      </p:grpSpPr>
+      <p:sp>
+        <p:nvSpPr>
+          <p:cNvPr id="2" name="Title 1"/>
+          <p:cNvSpPr>
+            <a:spLocks noGrp="1"/>
+          </p:cNvSpPr>
+          <p:nvPr>
+            <p:ph type="title"/>
+          </p:nvPr>
+        </p:nvSpPr>
+        <p:spPr/>
+        <p:txBody>
+          <a:bodyPr/>
+          <a:lstStyle/>
+          <a:p>
+            <a:pPr lvl="0" marL="0" indent="0">
+              <a:buNone/>
+            </a:pPr>
+            <a:r>
+              <a:rPr/>
+              <a:t>poster-jacobs.Rmd,</a:t>
+            </a:r>
+            <a:r>
+              <a:rPr/>
+              <a:t> </a:t>
+            </a:r>
+            <a:r>
+              <a:rPr/>
+              <a:t>block</a:t>
+            </a:r>
+          </a:p>
+        </p:txBody>
+      </p:sp>
+      <p:sp>
+        <p:nvSpPr>
+          <p:cNvPr id="3" name="Content Placeholder 2"/>
+          <p:cNvSpPr>
+            <a:spLocks noGrp="1"/>
+          </p:cNvSpPr>
+          <p:nvPr>
+            <p:ph idx="1"/>
+          </p:nvPr>
+        </p:nvSpPr>
+        <p:spPr/>
+        <p:txBody>
+          <a:bodyPr/>
+          <a:lstStyle/>
+          <a:p>
+            <a:pPr lvl="0" marL="1270000" indent="0">
+              <a:buNone/>
+            </a:pPr>
+            <a:r>
+              <a:rPr sz="1800">
+                <a:latin typeface="Courier"/>
+              </a:rPr>
+              <a:t>Objectives {.block}
+================================================================================
+Lorem ipsum dolor sit amet, consectetur, nunc tellus pulvinar tortor, commodo eleifend risus arcu sed odio:
+- Mollis dignissim, magna augue tincidunt dolor, interdum vestibulum urna
+- Sed aliquet luctus lectus, eget aliquet leo ullamcorper consequat. Vivamus eros sem, iaculis ut euismod non, sollicitudin vel orci.</a:t>
+            </a:r>
+          </a:p>
+        </p:txBody>
+      </p:sp>
+    </p:spTree>
+  </p:cSld>
+</p:sld>
+</file>
+
+<file path=ppt/slides/slide27.xml><?xml version="1.0" encoding="utf-8"?>
+<p:sld xmlns:a="http://schemas.openxmlformats.org/drawingml/2006/main" xmlns:r="http://schemas.openxmlformats.org/officeDocument/2006/relationships" xmlns:p="http://schemas.openxmlformats.org/presentationml/2006/main">
+  <p:cSld>
+    <p:spTree>
+      <p:nvGrpSpPr>
+        <p:cNvPr id="1" name=""/>
+        <p:cNvGrpSpPr/>
+        <p:nvPr/>
+      </p:nvGrpSpPr>
+      <p:grpSpPr>
+        <a:xfrm>
+          <a:off x="0" y="0"/>
+          <a:ext cx="0" cy="0"/>
+          <a:chOff x="0" y="0"/>
+          <a:chExt cx="0" cy="0"/>
+        </a:xfrm>
+      </p:grpSpPr>
+      <p:sp>
+        <p:nvSpPr>
+          <p:cNvPr id="2" name="Title 1"/>
+          <p:cNvSpPr>
+            <a:spLocks noGrp="1"/>
+          </p:cNvSpPr>
+          <p:nvPr>
+            <p:ph type="title"/>
+          </p:nvPr>
+        </p:nvSpPr>
+        <p:spPr/>
+        <p:txBody>
+          <a:bodyPr/>
+          <a:lstStyle/>
+          <a:p>
+            <a:pPr lvl="0" marL="0" indent="0">
+              <a:buNone/>
+            </a:pPr>
+            <a:r>
+              <a:rPr/>
+              <a:t>poster-jacobs.css,</a:t>
+            </a:r>
+            <a:r>
+              <a:rPr/>
+              <a:t> </a:t>
+            </a:r>
+            <a:r>
+              <a:rPr/>
+              <a:t>block</a:t>
+            </a:r>
+          </a:p>
+        </p:txBody>
+      </p:sp>
+      <p:sp>
+        <p:nvSpPr>
+          <p:cNvPr id="3" name="Content Placeholder 2"/>
+          <p:cNvSpPr>
+            <a:spLocks noGrp="1"/>
+          </p:cNvSpPr>
+          <p:nvPr>
+            <p:ph idx="1"/>
+          </p:nvPr>
+        </p:nvSpPr>
+        <p:spPr/>
+        <p:txBody>
+          <a:bodyPr/>
+          <a:lstStyle/>
+          <a:p>
+            <a:pPr lvl="0" marL="1270000" indent="0">
+              <a:buNone/>
+            </a:pPr>
+            <a:r>
+              <a:rPr sz="1800">
+                <a:latin typeface="Courier"/>
+              </a:rPr>
+              <a:t>.block {
+  border: .1in solid steelblue;
+  background-color: aliceblue;
+}
+.block h1 {
+  background-color: steelblue;
+  color: white;
+}
+.block &gt; .content {
+  padding: 1em;
+  line-height: 1.5em;
+}
+</a:t>
+            </a:r>
+          </a:p>
+        </p:txBody>
+      </p:sp>
+    </p:spTree>
+  </p:cSld>
+</p:sld>
+</file>
+
+<file path=ppt/slides/slide28.xml><?xml version="1.0" encoding="utf-8"?>
+<p:sld xmlns:a="http://schemas.openxmlformats.org/drawingml/2006/main" xmlns:r="http://schemas.openxmlformats.org/officeDocument/2006/relationships" xmlns:p="http://schemas.openxmlformats.org/presentationml/2006/main">
+  <p:cSld>
+    <p:spTree>
+      <p:nvGrpSpPr>
+        <p:cNvPr id="1" name=""/>
+        <p:cNvGrpSpPr/>
+        <p:nvPr/>
+      </p:nvGrpSpPr>
+      <p:grpSpPr>
+        <a:xfrm>
+          <a:off x="0" y="0"/>
+          <a:ext cx="0" cy="0"/>
+          <a:chOff x="0" y="0"/>
+          <a:chExt cx="0" cy="0"/>
+        </a:xfrm>
+      </p:grpSpPr>
+      <p:sp>
+        <p:nvSpPr>
+          <p:cNvPr id="2" name="Title 1"/>
+          <p:cNvSpPr>
+            <a:spLocks noGrp="1"/>
+          </p:cNvSpPr>
+          <p:nvPr>
+            <p:ph type="title"/>
+          </p:nvPr>
+        </p:nvSpPr>
+        <p:spPr/>
+        <p:txBody>
+          <a:bodyPr/>
+          <a:lstStyle/>
+          <a:p>
+            <a:pPr lvl="0" marL="0" indent="0">
+              <a:buNone/>
+            </a:pPr>
+            <a:r>
+              <a:rPr/>
+              <a:t>poster-jacobs.html,</a:t>
+            </a:r>
+            <a:r>
+              <a:rPr/>
+              <a:t> </a:t>
+            </a:r>
+            <a:r>
+              <a:rPr/>
+              <a:t>block</a:t>
+            </a:r>
+          </a:p>
+        </p:txBody>
+      </p:sp>
+      <p:pic>
+        <p:nvPicPr>
+          <p:cNvPr descr="../images/objectives.png" id="0" name="Picture 1"/>
+          <p:cNvPicPr>
+            <a:picLocks noGrp="1" noChangeAspect="1"/>
+          </p:cNvPicPr>
+          <p:nvPr/>
+        </p:nvPicPr>
+        <p:blipFill>
+          <a:blip r:embed="rId2"/>
+          <a:stretch>
+            <a:fillRect/>
+          </a:stretch>
+        </p:blipFill>
+        <p:spPr bwMode="auto">
+          <a:xfrm>
+            <a:off x="2806700" y="1600200"/>
+            <a:ext cx="3517900" cy="4013200"/>
+          </a:xfrm>
+          <a:prstGeom prst="rect">
+            <a:avLst/>
+          </a:prstGeom>
+          <a:noFill/>
+          <a:ln w="9525">
+            <a:noFill/>
+            <a:headEnd/>
+            <a:tailEnd/>
+          </a:ln>
+        </p:spPr>
+      </p:pic>
+      <p:sp>
+        <p:nvSpPr>
+          <p:cNvPr id="1" name="TextBox 3"/>
+          <p:cNvSpPr txBox="1"/>
+          <p:nvPr/>
+        </p:nvSpPr>
+        <p:spPr>
+          <a:xfrm>
+            <a:off x="457200" y="5613400"/>
+            <a:ext cx="8229600" cy="508000"/>
+          </a:xfrm>
+          <a:prstGeom prst="rect">
+            <a:avLst/>
+          </a:prstGeom>
+          <a:noFill/>
+        </p:spPr>
+        <p:txBody>
+          <a:bodyPr/>
+          <a:lstStyle/>
+          <a:p>
+            <a:pPr lvl="0" marL="0" indent="0" algn="ctr">
+              <a:buNone/>
+            </a:pPr>
+            <a:r>
+              <a:rPr/>
+              <a:t>Objectives</a:t>
+            </a:r>
+            <a:r>
+              <a:rPr/>
+              <a:t> </a:t>
+            </a:r>
+            <a:r>
+              <a:rPr/>
+              <a:t>section</a:t>
+            </a:r>
+            <a:r>
+              <a:rPr/>
+              <a:t> </a:t>
+            </a:r>
+            <a:r>
+              <a:rPr/>
+              <a:t>of</a:t>
+            </a:r>
+            <a:r>
+              <a:rPr/>
+              <a:t> </a:t>
+            </a:r>
+            <a:r>
+              <a:rPr/>
+              <a:t>poster</a:t>
+            </a:r>
+          </a:p>
+        </p:txBody>
+      </p:sp>
+    </p:spTree>
+  </p:cSld>
+</p:sld>
+</file>
+
+<file path=ppt/slides/slide29.xml><?xml version="1.0" encoding="utf-8"?>
+<p:sld xmlns:a="http://schemas.openxmlformats.org/drawingml/2006/main" xmlns:r="http://schemas.openxmlformats.org/officeDocument/2006/relationships" xmlns:p="http://schemas.openxmlformats.org/presentationml/2006/main">
+  <p:cSld>
+    <p:spTree>
+      <p:nvGrpSpPr>
+        <p:cNvPr id="1" name=""/>
+        <p:cNvGrpSpPr/>
+        <p:nvPr/>
+      </p:nvGrpSpPr>
+      <p:grpSpPr>
+        <a:xfrm>
+          <a:off x="0" y="0"/>
+          <a:ext cx="0" cy="0"/>
+          <a:chOff x="0" y="0"/>
+          <a:chExt cx="0" cy="0"/>
+        </a:xfrm>
+      </p:grpSpPr>
+      <p:sp>
+        <p:nvSpPr>
+          <p:cNvPr id="2" name="Title 1"/>
+          <p:cNvSpPr>
+            <a:spLocks noGrp="1"/>
+          </p:cNvSpPr>
+          <p:nvPr>
+            <p:ph type="title"/>
+          </p:nvPr>
+        </p:nvSpPr>
+        <p:spPr/>
+        <p:txBody>
+          <a:bodyPr/>
+          <a:lstStyle/>
+          <a:p>
+            <a:pPr lvl="0" marL="0" indent="0">
+              <a:buNone/>
+            </a:pPr>
+            <a:r>
+              <a:rPr/>
+              <a:t>poster-jacobs.Rmd,</a:t>
+            </a:r>
+            <a:r>
+              <a:rPr/>
+              <a:t> </a:t>
+            </a:r>
+            <a:r>
+              <a:rPr/>
+              <a:t>orange</a:t>
+            </a:r>
+            <a:r>
+              <a:rPr/>
+              <a:t> </a:t>
+            </a:r>
+            <a:r>
+              <a:rPr/>
+              <a:t>highlight</a:t>
+            </a:r>
+          </a:p>
+        </p:txBody>
+      </p:sp>
+      <p:sp>
+        <p:nvSpPr>
+          <p:cNvPr id="3" name="Content Placeholder 2"/>
+          <p:cNvSpPr>
+            <a:spLocks noGrp="1"/>
+          </p:cNvSpPr>
+          <p:nvPr>
+            <p:ph idx="1"/>
+          </p:nvPr>
+        </p:nvSpPr>
+        <p:spPr/>
+        <p:txBody>
+          <a:bodyPr/>
+          <a:lstStyle/>
+          <a:p>
+            <a:pPr lvl="0" marL="1270000" indent="0">
+              <a:buNone/>
+            </a:pPr>
+            <a:r>
+              <a:rPr sz="1800">
+                <a:latin typeface="Courier"/>
+              </a:rPr>
+              <a:t>Contact Information {.block data-color=black data-border-color=orange data-background-color=white}
+================================================================================
+- Web: https://www.example.org/smithlab
+- Email: john@example.org
+- Phone: +1 (000) 111 1111
+</a:t>
+            </a:r>
+          </a:p>
+        </p:txBody>
+      </p:sp>
+    </p:spTree>
+  </p:cSld>
+</p:sld>
+</file>
+
 <file path=ppt/slides/slide3.xml><?xml version="1.0" encoding="utf-8"?>
 <p:sld xmlns:a="http://schemas.openxmlformats.org/drawingml/2006/main" xmlns:r="http://schemas.openxmlformats.org/officeDocument/2006/relationships" xmlns:p="http://schemas.openxmlformats.org/presentationml/2006/main">
   <p:cSld>
@@ -4148,6 +5820,682 @@
             <a:r>
               <a:rPr/>
               <a:t>tidyverse packages</a:t>
+            </a:r>
+          </a:p>
+        </p:txBody>
+      </p:sp>
+    </p:spTree>
+  </p:cSld>
+</p:sld>
+</file>
+
+<file path=ppt/slides/slide30.xml><?xml version="1.0" encoding="utf-8"?>
+<p:sld xmlns:a="http://schemas.openxmlformats.org/drawingml/2006/main" xmlns:r="http://schemas.openxmlformats.org/officeDocument/2006/relationships" xmlns:p="http://schemas.openxmlformats.org/presentationml/2006/main">
+  <p:cSld>
+    <p:spTree>
+      <p:nvGrpSpPr>
+        <p:cNvPr id="1" name=""/>
+        <p:cNvGrpSpPr/>
+        <p:nvPr/>
+      </p:nvGrpSpPr>
+      <p:grpSpPr>
+        <a:xfrm>
+          <a:off x="0" y="0"/>
+          <a:ext cx="0" cy="0"/>
+          <a:chOff x="0" y="0"/>
+          <a:chExt cx="0" cy="0"/>
+        </a:xfrm>
+      </p:grpSpPr>
+      <p:sp>
+        <p:nvSpPr>
+          <p:cNvPr id="2" name="Title 1"/>
+          <p:cNvSpPr>
+            <a:spLocks noGrp="1"/>
+          </p:cNvSpPr>
+          <p:nvPr>
+            <p:ph type="title"/>
+          </p:nvPr>
+        </p:nvSpPr>
+        <p:spPr/>
+        <p:txBody>
+          <a:bodyPr/>
+          <a:lstStyle/>
+          <a:p>
+            <a:pPr lvl="0" marL="0" indent="0">
+              <a:buNone/>
+            </a:pPr>
+            <a:r>
+              <a:rPr/>
+              <a:t>poster-jacobs.html,</a:t>
+            </a:r>
+            <a:r>
+              <a:rPr/>
+              <a:t> </a:t>
+            </a:r>
+            <a:r>
+              <a:rPr/>
+              <a:t>orange</a:t>
+            </a:r>
+            <a:r>
+              <a:rPr/>
+              <a:t> </a:t>
+            </a:r>
+            <a:r>
+              <a:rPr/>
+              <a:t>highlight</a:t>
+            </a:r>
+          </a:p>
+        </p:txBody>
+      </p:sp>
+      <p:pic>
+        <p:nvPicPr>
+          <p:cNvPr descr="../images/contact-information.png" id="0" name="Picture 1"/>
+          <p:cNvPicPr>
+            <a:picLocks noGrp="1" noChangeAspect="1"/>
+          </p:cNvPicPr>
+          <p:nvPr/>
+        </p:nvPicPr>
+        <p:blipFill>
+          <a:blip r:embed="rId2"/>
+          <a:stretch>
+            <a:fillRect/>
+          </a:stretch>
+        </p:blipFill>
+        <p:spPr bwMode="auto">
+          <a:xfrm>
+            <a:off x="457200" y="1816100"/>
+            <a:ext cx="8229600" cy="3581400"/>
+          </a:xfrm>
+          <a:prstGeom prst="rect">
+            <a:avLst/>
+          </a:prstGeom>
+          <a:noFill/>
+          <a:ln w="9525">
+            <a:noFill/>
+            <a:headEnd/>
+            <a:tailEnd/>
+          </a:ln>
+        </p:spPr>
+      </p:pic>
+      <p:sp>
+        <p:nvSpPr>
+          <p:cNvPr id="1" name="TextBox 3"/>
+          <p:cNvSpPr txBox="1"/>
+          <p:nvPr/>
+        </p:nvSpPr>
+        <p:spPr>
+          <a:xfrm>
+            <a:off x="457200" y="5613400"/>
+            <a:ext cx="8229600" cy="508000"/>
+          </a:xfrm>
+          <a:prstGeom prst="rect">
+            <a:avLst/>
+          </a:prstGeom>
+          <a:noFill/>
+        </p:spPr>
+        <p:txBody>
+          <a:bodyPr/>
+          <a:lstStyle/>
+          <a:p>
+            <a:pPr lvl="0" marL="0" indent="0" algn="ctr">
+              <a:buNone/>
+            </a:pPr>
+            <a:r>
+              <a:rPr/>
+              <a:t>Contact</a:t>
+            </a:r>
+            <a:r>
+              <a:rPr/>
+              <a:t> </a:t>
+            </a:r>
+            <a:r>
+              <a:rPr/>
+              <a:t>information</a:t>
+            </a:r>
+            <a:r>
+              <a:rPr/>
+              <a:t> </a:t>
+            </a:r>
+            <a:r>
+              <a:rPr/>
+              <a:t>section</a:t>
+            </a:r>
+            <a:r>
+              <a:rPr/>
+              <a:t> </a:t>
+            </a:r>
+            <a:r>
+              <a:rPr/>
+              <a:t>of</a:t>
+            </a:r>
+            <a:r>
+              <a:rPr/>
+              <a:t> </a:t>
+            </a:r>
+            <a:r>
+              <a:rPr/>
+              <a:t>poster</a:t>
+            </a:r>
+          </a:p>
+        </p:txBody>
+      </p:sp>
+    </p:spTree>
+  </p:cSld>
+</p:sld>
+</file>
+
+<file path=ppt/slides/slide31.xml><?xml version="1.0" encoding="utf-8"?>
+<p:sld xmlns:a="http://schemas.openxmlformats.org/drawingml/2006/main" xmlns:r="http://schemas.openxmlformats.org/officeDocument/2006/relationships" xmlns:p="http://schemas.openxmlformats.org/presentationml/2006/main">
+  <p:cSld>
+    <p:spTree>
+      <p:nvGrpSpPr>
+        <p:cNvPr id="1" name=""/>
+        <p:cNvGrpSpPr/>
+        <p:nvPr/>
+      </p:nvGrpSpPr>
+      <p:grpSpPr>
+        <a:xfrm>
+          <a:off x="0" y="0"/>
+          <a:ext cx="0" cy="0"/>
+          <a:chOff x="0" y="0"/>
+          <a:chExt cx="0" cy="0"/>
+        </a:xfrm>
+      </p:grpSpPr>
+      <p:sp>
+        <p:nvSpPr>
+          <p:cNvPr id="2" name="Title 1"/>
+          <p:cNvSpPr>
+            <a:spLocks noGrp="1"/>
+          </p:cNvSpPr>
+          <p:nvPr>
+            <p:ph type="title"/>
+          </p:nvPr>
+        </p:nvSpPr>
+        <p:spPr/>
+        <p:txBody>
+          <a:bodyPr/>
+          <a:lstStyle/>
+          <a:p>
+            <a:pPr lvl="0" marL="0" indent="0">
+              <a:buNone/>
+            </a:pPr>
+            <a:r>
+              <a:rPr/>
+              <a:t>poster-jacobs.html,</a:t>
+            </a:r>
+            <a:r>
+              <a:rPr/>
+              <a:t> </a:t>
+            </a:r>
+            <a:r>
+              <a:rPr/>
+              <a:t>entire</a:t>
+            </a:r>
+            <a:r>
+              <a:rPr/>
+              <a:t> </a:t>
+            </a:r>
+            <a:r>
+              <a:rPr/>
+              <a:t>poster</a:t>
+            </a:r>
+          </a:p>
+        </p:txBody>
+      </p:sp>
+      <p:pic>
+        <p:nvPicPr>
+          <p:cNvPr descr="../images/entire-poster.png" id="0" name="Picture 1"/>
+          <p:cNvPicPr>
+            <a:picLocks noGrp="1" noChangeAspect="1"/>
+          </p:cNvPicPr>
+          <p:nvPr/>
+        </p:nvPicPr>
+        <p:blipFill>
+          <a:blip r:embed="rId2"/>
+          <a:stretch>
+            <a:fillRect/>
+          </a:stretch>
+        </p:blipFill>
+        <p:spPr bwMode="auto">
+          <a:xfrm>
+            <a:off x="1676400" y="1600200"/>
+            <a:ext cx="5803900" cy="4013200"/>
+          </a:xfrm>
+          <a:prstGeom prst="rect">
+            <a:avLst/>
+          </a:prstGeom>
+          <a:noFill/>
+          <a:ln w="9525">
+            <a:noFill/>
+            <a:headEnd/>
+            <a:tailEnd/>
+          </a:ln>
+        </p:spPr>
+      </p:pic>
+      <p:sp>
+        <p:nvSpPr>
+          <p:cNvPr id="1" name="TextBox 3"/>
+          <p:cNvSpPr txBox="1"/>
+          <p:nvPr/>
+        </p:nvSpPr>
+        <p:spPr>
+          <a:xfrm>
+            <a:off x="457200" y="5613400"/>
+            <a:ext cx="8229600" cy="508000"/>
+          </a:xfrm>
+          <a:prstGeom prst="rect">
+            <a:avLst/>
+          </a:prstGeom>
+          <a:noFill/>
+        </p:spPr>
+        <p:txBody>
+          <a:bodyPr/>
+          <a:lstStyle/>
+          <a:p>
+            <a:pPr lvl="0" marL="0" indent="0" algn="ctr">
+              <a:buNone/>
+            </a:pPr>
+            <a:r>
+              <a:rPr/>
+              <a:t>Entire</a:t>
+            </a:r>
+            <a:r>
+              <a:rPr/>
+              <a:t> </a:t>
+            </a:r>
+            <a:r>
+              <a:rPr/>
+              <a:t>poster</a:t>
+            </a:r>
+          </a:p>
+        </p:txBody>
+      </p:sp>
+    </p:spTree>
+  </p:cSld>
+</p:sld>
+</file>
+
+<file path=ppt/slides/slide32.xml><?xml version="1.0" encoding="utf-8"?>
+<p:sld xmlns:a="http://schemas.openxmlformats.org/drawingml/2006/main" xmlns:r="http://schemas.openxmlformats.org/officeDocument/2006/relationships" xmlns:p="http://schemas.openxmlformats.org/presentationml/2006/main">
+  <p:cSld>
+    <p:spTree>
+      <p:nvGrpSpPr>
+        <p:cNvPr id="1" name=""/>
+        <p:cNvGrpSpPr/>
+        <p:nvPr/>
+      </p:nvGrpSpPr>
+      <p:grpSpPr>
+        <a:xfrm>
+          <a:off x="0" y="0"/>
+          <a:ext cx="0" cy="0"/>
+          <a:chOff x="0" y="0"/>
+          <a:chExt cx="0" cy="0"/>
+        </a:xfrm>
+      </p:grpSpPr>
+      <p:sp>
+        <p:nvSpPr>
+          <p:cNvPr id="2" name="Title 1"/>
+          <p:cNvSpPr>
+            <a:spLocks noGrp="1"/>
+          </p:cNvSpPr>
+          <p:nvPr>
+            <p:ph type="title"/>
+          </p:nvPr>
+        </p:nvSpPr>
+        <p:spPr/>
+        <p:txBody>
+          <a:bodyPr/>
+          <a:lstStyle/>
+          <a:p>
+            <a:pPr lvl="0" marL="0" indent="0">
+              <a:buNone/>
+            </a:pPr>
+            <a:r>
+              <a:rPr/>
+              <a:t>My</a:t>
+            </a:r>
+            <a:r>
+              <a:rPr/>
+              <a:t> </a:t>
+            </a:r>
+            <a:r>
+              <a:rPr/>
+              <a:t>poster</a:t>
+            </a:r>
+          </a:p>
+        </p:txBody>
+      </p:sp>
+      <p:pic>
+        <p:nvPicPr>
+          <p:cNvPr descr="../images/scrooge-poster.png" id="0" name="Picture 1"/>
+          <p:cNvPicPr>
+            <a:picLocks noGrp="1" noChangeAspect="1"/>
+          </p:cNvPicPr>
+          <p:nvPr/>
+        </p:nvPicPr>
+        <p:blipFill>
+          <a:blip r:embed="rId2"/>
+          <a:stretch>
+            <a:fillRect/>
+          </a:stretch>
+        </p:blipFill>
+        <p:spPr bwMode="auto">
+          <a:xfrm>
+            <a:off x="1663700" y="1600200"/>
+            <a:ext cx="5816600" cy="4013200"/>
+          </a:xfrm>
+          <a:prstGeom prst="rect">
+            <a:avLst/>
+          </a:prstGeom>
+          <a:noFill/>
+          <a:ln w="9525">
+            <a:noFill/>
+            <a:headEnd/>
+            <a:tailEnd/>
+          </a:ln>
+        </p:spPr>
+      </p:pic>
+      <p:sp>
+        <p:nvSpPr>
+          <p:cNvPr id="1" name="TextBox 3"/>
+          <p:cNvSpPr txBox="1"/>
+          <p:nvPr/>
+        </p:nvSpPr>
+        <p:spPr>
+          <a:xfrm>
+            <a:off x="457200" y="5613400"/>
+            <a:ext cx="8229600" cy="508000"/>
+          </a:xfrm>
+          <a:prstGeom prst="rect">
+            <a:avLst/>
+          </a:prstGeom>
+          <a:noFill/>
+        </p:spPr>
+        <p:txBody>
+          <a:bodyPr/>
+          <a:lstStyle/>
+          <a:p>
+            <a:pPr lvl="0" marL="0" indent="0" algn="ctr">
+              <a:buNone/>
+            </a:pPr>
+            <a:r>
+              <a:rPr/>
+              <a:t>Layout</a:t>
+            </a:r>
+            <a:r>
+              <a:rPr/>
+              <a:t> </a:t>
+            </a:r>
+            <a:r>
+              <a:rPr/>
+              <a:t>for</a:t>
+            </a:r>
+            <a:r>
+              <a:rPr/>
+              <a:t> </a:t>
+            </a:r>
+            <a:r>
+              <a:rPr/>
+              <a:t>my</a:t>
+            </a:r>
+            <a:r>
+              <a:rPr/>
+              <a:t> </a:t>
+            </a:r>
+            <a:r>
+              <a:rPr/>
+              <a:t>poster</a:t>
+            </a:r>
+          </a:p>
+        </p:txBody>
+      </p:sp>
+    </p:spTree>
+  </p:cSld>
+</p:sld>
+</file>
+
+<file path=ppt/slides/slide33.xml><?xml version="1.0" encoding="utf-8"?>
+<p:sld xmlns:a="http://schemas.openxmlformats.org/drawingml/2006/main" xmlns:r="http://schemas.openxmlformats.org/officeDocument/2006/relationships" xmlns:p="http://schemas.openxmlformats.org/presentationml/2006/main">
+  <p:cSld>
+    <p:spTree>
+      <p:nvGrpSpPr>
+        <p:cNvPr id="1" name=""/>
+        <p:cNvGrpSpPr/>
+        <p:nvPr/>
+      </p:nvGrpSpPr>
+      <p:grpSpPr>
+        <a:xfrm>
+          <a:off x="0" y="0"/>
+          <a:ext cx="0" cy="0"/>
+          <a:chOff x="0" y="0"/>
+          <a:chExt cx="0" cy="0"/>
+        </a:xfrm>
+      </p:grpSpPr>
+      <p:sp>
+        <p:nvSpPr>
+          <p:cNvPr id="2" name="Title 1"/>
+          <p:cNvSpPr>
+            <a:spLocks noGrp="1"/>
+          </p:cNvSpPr>
+          <p:nvPr>
+            <p:ph type="title"/>
+          </p:nvPr>
+        </p:nvSpPr>
+        <p:spPr/>
+        <p:txBody>
+          <a:bodyPr/>
+          <a:lstStyle/>
+          <a:p>
+            <a:pPr lvl="0" marL="0" indent="0">
+              <a:buNone/>
+            </a:pPr>
+            <a:r>
+              <a:rPr/>
+              <a:t>Some</a:t>
+            </a:r>
+            <a:r>
+              <a:rPr/>
+              <a:t> </a:t>
+            </a:r>
+            <a:r>
+              <a:rPr/>
+              <a:t>hints</a:t>
+            </a:r>
+          </a:p>
+        </p:txBody>
+      </p:sp>
+      <p:sp>
+        <p:nvSpPr>
+          <p:cNvPr id="3" name="Content Placeholder 2"/>
+          <p:cNvSpPr>
+            <a:spLocks noGrp="1"/>
+          </p:cNvSpPr>
+          <p:nvPr>
+            <p:ph idx="1"/>
+          </p:nvPr>
+        </p:nvSpPr>
+        <p:spPr/>
+        <p:txBody>
+          <a:bodyPr/>
+          <a:lstStyle/>
+          <a:p>
+            <a:pPr lvl="1"/>
+            <a:r>
+              <a:rPr/>
+              <a:t>This is NOT a WYSIWYG approach</a:t>
+            </a:r>
+          </a:p>
+          <a:p>
+            <a:pPr lvl="1"/>
+            <a:r>
+              <a:rPr/>
+              <a:t>Size of image files is important</a:t>
+            </a:r>
+          </a:p>
+          <a:p>
+            <a:pPr lvl="2"/>
+            <a:r>
+              <a:rPr/>
+              <a:t>Pagedown will NOT resize to fit</a:t>
+            </a:r>
+          </a:p>
+          <a:p>
+            <a:pPr lvl="1"/>
+            <a:r>
+              <a:rPr/>
+              <a:t>Text can overflow boundaries</a:t>
+            </a:r>
+          </a:p>
+          <a:p>
+            <a:pPr lvl="2"/>
+            <a:r>
+              <a:rPr/>
+              <a:t>Easier to modify the text than the CSS file</a:t>
+            </a:r>
+          </a:p>
+        </p:txBody>
+      </p:sp>
+    </p:spTree>
+  </p:cSld>
+</p:sld>
+</file>
+
+<file path=ppt/slides/slide34.xml><?xml version="1.0" encoding="utf-8"?>
+<p:sld xmlns:a="http://schemas.openxmlformats.org/drawingml/2006/main" xmlns:r="http://schemas.openxmlformats.org/officeDocument/2006/relationships" xmlns:p="http://schemas.openxmlformats.org/presentationml/2006/main">
+  <p:cSld>
+    <p:spTree>
+      <p:nvGrpSpPr>
+        <p:cNvPr id="1" name=""/>
+        <p:cNvGrpSpPr/>
+        <p:nvPr/>
+      </p:nvGrpSpPr>
+      <p:grpSpPr>
+        <a:xfrm>
+          <a:off x="0" y="0"/>
+          <a:ext cx="0" cy="0"/>
+          <a:chOff x="0" y="0"/>
+          <a:chExt cx="0" cy="0"/>
+        </a:xfrm>
+      </p:grpSpPr>
+      <p:sp>
+        <p:nvSpPr>
+          <p:cNvPr id="2" name="Title 1"/>
+          <p:cNvSpPr>
+            <a:spLocks noGrp="1"/>
+          </p:cNvSpPr>
+          <p:nvPr>
+            <p:ph type="title"/>
+          </p:nvPr>
+        </p:nvSpPr>
+        <p:spPr/>
+        <p:txBody>
+          <a:bodyPr/>
+          <a:lstStyle/>
+          <a:p>
+            <a:pPr lvl="0" marL="0" indent="0">
+              <a:buNone/>
+            </a:pPr>
+            <a:r>
+              <a:rPr/>
+              <a:t>Why</a:t>
+            </a:r>
+            <a:r>
+              <a:rPr/>
+              <a:t> </a:t>
+            </a:r>
+            <a:r>
+              <a:rPr/>
+              <a:t>I</a:t>
+            </a:r>
+            <a:r>
+              <a:rPr/>
+              <a:t> </a:t>
+            </a:r>
+            <a:r>
+              <a:rPr/>
+              <a:t>like</a:t>
+            </a:r>
+            <a:r>
+              <a:rPr/>
+              <a:t> </a:t>
+            </a:r>
+            <a:r>
+              <a:rPr/>
+              <a:t>pagedown</a:t>
+            </a:r>
+            <a:r>
+              <a:rPr/>
+              <a:t> </a:t>
+            </a:r>
+            <a:r>
+              <a:rPr/>
+              <a:t>for</a:t>
+            </a:r>
+            <a:r>
+              <a:rPr/>
+              <a:t> </a:t>
+            </a:r>
+            <a:r>
+              <a:rPr/>
+              <a:t>posters</a:t>
+            </a:r>
+          </a:p>
+        </p:txBody>
+      </p:sp>
+      <p:sp>
+        <p:nvSpPr>
+          <p:cNvPr id="3" name="Content Placeholder 2"/>
+          <p:cNvSpPr>
+            <a:spLocks noGrp="1"/>
+          </p:cNvSpPr>
+          <p:nvPr>
+            <p:ph idx="1"/>
+          </p:nvPr>
+        </p:nvSpPr>
+        <p:spPr/>
+        <p:txBody>
+          <a:bodyPr/>
+          <a:lstStyle/>
+          <a:p>
+            <a:pPr lvl="1"/>
+            <a:r>
+              <a:rPr/>
+              <a:t>I hate Powerpoint</a:t>
+            </a:r>
+          </a:p>
+          <a:p>
+            <a:pPr lvl="2"/>
+            <a:r>
+              <a:rPr/>
+              <a:t>Proprietary</a:t>
+            </a:r>
+          </a:p>
+          <a:p>
+            <a:pPr lvl="2"/>
+            <a:r>
+              <a:rPr/>
+              <a:t>Binary format</a:t>
+            </a:r>
+          </a:p>
+          <a:p>
+            <a:pPr lvl="1"/>
+            <a:r>
+              <a:rPr/>
+              <a:t>Focus on content independent of layout</a:t>
+            </a:r>
+          </a:p>
+          <a:p>
+            <a:pPr lvl="1"/>
+            <a:r>
+              <a:rPr/>
+              <a:t>Integrates easily with git</a:t>
+            </a:r>
+          </a:p>
+          <a:p>
+            <a:pPr lvl="1"/>
+            <a:r>
+              <a:rPr/>
+              <a:t>Easy to include complex formulas</a:t>
             </a:r>
           </a:p>
         </p:txBody>
@@ -5109,6 +7457,14 @@
             </a:pPr>
             <a:r>
               <a:rPr/>
+              <a:t>knitr,</a:t>
+            </a:r>
+            <a:r>
+              <a:rPr/>
+              <a:t> </a:t>
+            </a:r>
+            <a:r>
+              <a:rPr/>
               <a:t>Yihui</a:t>
             </a:r>
             <a:r>
@@ -5172,14 +7528,21 @@
             <a:pPr lvl="1"/>
             <a:r>
               <a:rPr/>
-              <a:t>Using markdown language in creative ways</a:t>
+              <a:t>Successor to sweave</a:t>
             </a:r>
           </a:p>
           <a:p>
             <a:pPr lvl="1"/>
             <a:r>
               <a:rPr/>
-              <a:t>Successor to sweave</a:t>
+              <a:t>Integrates program code, output, and documentation</a:t>
+            </a:r>
+          </a:p>
+          <a:p>
+            <a:pPr lvl="1"/>
+            <a:r>
+              <a:rPr/>
+              <a:t>Uses plain text files</a:t>
             </a:r>
           </a:p>
         </p:txBody>

</xml_diff>